<commit_message>
slide on current docker files and minor edits
</commit_message>
<xml_diff>
--- a/kubernetes/k8s-bulletinboard/0x_k8s-bulletinboard-Pipeline.pptx
+++ b/kubernetes/k8s-bulletinboard/0x_k8s-bulletinboard-Pipeline.pptx
@@ -5,10 +5,10 @@
     <p:sldMasterId id="2147483733" r:id="rId1"/>
   </p:sldMasterIdLst>
   <p:notesMasterIdLst>
-    <p:notesMasterId r:id="rId10"/>
+    <p:notesMasterId r:id="rId12"/>
   </p:notesMasterIdLst>
   <p:handoutMasterIdLst>
-    <p:handoutMasterId r:id="rId11"/>
+    <p:handoutMasterId r:id="rId13"/>
   </p:handoutMasterIdLst>
   <p:sldIdLst>
     <p:sldId id="433" r:id="rId2"/>
@@ -18,7 +18,9 @@
     <p:sldId id="888" r:id="rId6"/>
     <p:sldId id="889" r:id="rId7"/>
     <p:sldId id="890" r:id="rId8"/>
-    <p:sldId id="265" r:id="rId9"/>
+    <p:sldId id="891" r:id="rId9"/>
+    <p:sldId id="892" r:id="rId10"/>
+    <p:sldId id="265" r:id="rId11"/>
   </p:sldIdLst>
   <p:sldSz cx="12195175" cy="6858000"/>
   <p:notesSz cx="20561300" cy="29452888"/>
@@ -933,7 +935,7 @@
             <a:fld id="{7D8C2C35-2B8A-446E-BEC0-FD36716C29AC}" type="slidenum">
               <a:rPr lang="de-DE" smtClean="0"/>
               <a:pPr/>
-              <a:t>8</a:t>
+              <a:t>10</a:t>
             </a:fld>
             <a:endParaRPr lang="de-DE" dirty="0"/>
           </a:p>
@@ -14472,6 +14474,32 @@
   <p:clrMapOvr>
     <a:masterClrMapping/>
   </p:clrMapOvr>
+</p:sld>
+</file>
+
+<file path=ppt/slides/slide10.xml><?xml version="1.0" encoding="utf-8"?>
+<p:sld xmlns:a="http://schemas.openxmlformats.org/drawingml/2006/main" xmlns:r="http://schemas.openxmlformats.org/officeDocument/2006/relationships" xmlns:p="http://schemas.openxmlformats.org/presentationml/2006/main" show="0">
+  <p:cSld>
+    <p:spTree>
+      <p:nvGrpSpPr>
+        <p:cNvPr id="1" name=""/>
+        <p:cNvGrpSpPr/>
+        <p:nvPr/>
+      </p:nvGrpSpPr>
+      <p:grpSpPr>
+        <a:xfrm>
+          <a:off x="0" y="0"/>
+          <a:ext cx="0" cy="0"/>
+          <a:chOff x="0" y="0"/>
+          <a:chExt cx="0" cy="0"/>
+        </a:xfrm>
+      </p:grpSpPr>
+    </p:spTree>
+  </p:cSld>
+  <p:clrMapOvr>
+    <a:masterClrMapping/>
+  </p:clrMapOvr>
+  <p:transition spd="med"/>
 </p:sld>
 </file>
 
@@ -20906,7 +20934,7 @@
           <a:p>
             <a:r>
               <a:rPr lang="en-US" dirty="0"/>
-              <a:t>Current Scans</a:t>
+              <a:t>Intermediate Stage</a:t>
             </a:r>
           </a:p>
         </p:txBody>
@@ -21042,7 +21070,7 @@
 </file>
 
 <file path=ppt/slides/slide8.xml><?xml version="1.0" encoding="utf-8"?>
-<p:sld xmlns:a="http://schemas.openxmlformats.org/drawingml/2006/main" xmlns:r="http://schemas.openxmlformats.org/officeDocument/2006/relationships" xmlns:p="http://schemas.openxmlformats.org/presentationml/2006/main" show="0">
+<p:sld xmlns:a="http://schemas.openxmlformats.org/drawingml/2006/main" xmlns:r="http://schemas.openxmlformats.org/officeDocument/2006/relationships" xmlns:p="http://schemas.openxmlformats.org/presentationml/2006/main">
   <p:cSld>
     <p:spTree>
       <p:nvGrpSpPr>
@@ -21058,12 +21086,2616 @@
           <a:chExt cx="0" cy="0"/>
         </a:xfrm>
       </p:grpSpPr>
+      <p:pic>
+        <p:nvPicPr>
+          <p:cNvPr id="12" name="Picture 11">
+            <a:extLst>
+              <a:ext uri="{FF2B5EF4-FFF2-40B4-BE49-F238E27FC236}">
+                <a16:creationId xmlns:a16="http://schemas.microsoft.com/office/drawing/2014/main" id="{1B8C9409-D987-4776-8905-342A1E7B65ED}"/>
+              </a:ext>
+            </a:extLst>
+          </p:cNvPr>
+          <p:cNvPicPr>
+            <a:picLocks noChangeAspect="1"/>
+          </p:cNvPicPr>
+          <p:nvPr/>
+        </p:nvPicPr>
+        <p:blipFill>
+          <a:blip r:embed="rId2"/>
+          <a:stretch>
+            <a:fillRect/>
+          </a:stretch>
+        </p:blipFill>
+        <p:spPr>
+          <a:xfrm>
+            <a:off x="6220416" y="2035127"/>
+            <a:ext cx="5572899" cy="3613198"/>
+          </a:xfrm>
+          <a:prstGeom prst="rect">
+            <a:avLst/>
+          </a:prstGeom>
+        </p:spPr>
+      </p:pic>
+      <p:sp>
+        <p:nvSpPr>
+          <p:cNvPr id="2" name="Text Placeholder 1">
+            <a:extLst>
+              <a:ext uri="{FF2B5EF4-FFF2-40B4-BE49-F238E27FC236}">
+                <a16:creationId xmlns:a16="http://schemas.microsoft.com/office/drawing/2014/main" id="{19411DFA-73D0-4A30-BC2C-6D425AC5DB5A}"/>
+              </a:ext>
+            </a:extLst>
+          </p:cNvPr>
+          <p:cNvSpPr>
+            <a:spLocks noGrp="1"/>
+          </p:cNvSpPr>
+          <p:nvPr>
+            <p:ph type="body" sz="quarter" idx="10"/>
+          </p:nvPr>
+        </p:nvSpPr>
+        <p:spPr>
+          <a:xfrm>
+            <a:off x="503999" y="1276141"/>
+            <a:ext cx="5524695" cy="4551903"/>
+          </a:xfrm>
+        </p:spPr>
+        <p:txBody>
+          <a:bodyPr/>
+          <a:lstStyle/>
+          <a:p>
+            <a:r>
+              <a:rPr lang="en-US" dirty="0"/>
+              <a:t>We improved this further by</a:t>
+            </a:r>
+          </a:p>
+          <a:p>
+            <a:pPr marL="342900" indent="-342900">
+              <a:buFontTx/>
+              <a:buChar char="-"/>
+            </a:pPr>
+            <a:r>
+              <a:rPr lang="en-US" dirty="0"/>
+              <a:t>Keeping Dependency versions up to date.</a:t>
+            </a:r>
+          </a:p>
+          <a:p>
+            <a:pPr marL="342900" indent="-342900">
+              <a:buFontTx/>
+              <a:buChar char="-"/>
+            </a:pPr>
+            <a:r>
+              <a:rPr lang="en-US" dirty="0"/>
+              <a:t>Runtime change to custom Java11 JRE</a:t>
+            </a:r>
+          </a:p>
+          <a:p>
+            <a:pPr marL="342900" indent="-342900">
+              <a:buFontTx/>
+              <a:buChar char="-"/>
+            </a:pPr>
+            <a:r>
+              <a:rPr lang="en-US" dirty="0"/>
+              <a:t>Final image from scratch. Libs from latest </a:t>
+            </a:r>
+            <a:r>
+              <a:rPr lang="en-US" dirty="0" err="1"/>
+              <a:t>alpine:edge</a:t>
+            </a:r>
+            <a:r>
+              <a:rPr lang="en-US" dirty="0"/>
+              <a:t> </a:t>
+            </a:r>
+          </a:p>
+          <a:p>
+            <a:r>
+              <a:rPr lang="en-US" dirty="0"/>
+              <a:t>This reduced image size to ~110mb and reduced scan times to ~4-5min.  </a:t>
+            </a:r>
+          </a:p>
+          <a:p>
+            <a:r>
+              <a:rPr lang="en-US" dirty="0"/>
+              <a:t>Result: </a:t>
+            </a:r>
+          </a:p>
+          <a:p>
+            <a:pPr marL="342900" indent="-342900">
+              <a:buFontTx/>
+              <a:buChar char="-"/>
+            </a:pPr>
+            <a:r>
+              <a:rPr lang="en-US" dirty="0"/>
+              <a:t>1 Issue remains, due to a false positive matching, Synopsys R&amp;D is investigating this.</a:t>
+            </a:r>
+            <a:br>
+              <a:rPr lang="en-US" dirty="0"/>
+            </a:br>
+            <a:r>
+              <a:rPr lang="en-US" sz="1200" dirty="0"/>
+              <a:t>(postgres-jdbc-2.42.8 falsely accused of CVE-2019-13567)</a:t>
+            </a:r>
+            <a:endParaRPr lang="en-US" dirty="0"/>
+          </a:p>
+        </p:txBody>
+      </p:sp>
+      <p:sp>
+        <p:nvSpPr>
+          <p:cNvPr id="3" name="Title 2">
+            <a:extLst>
+              <a:ext uri="{FF2B5EF4-FFF2-40B4-BE49-F238E27FC236}">
+                <a16:creationId xmlns:a16="http://schemas.microsoft.com/office/drawing/2014/main" id="{75B5C1A0-C051-4AD0-881A-27A0F12DDF94}"/>
+              </a:ext>
+            </a:extLst>
+          </p:cNvPr>
+          <p:cNvSpPr>
+            <a:spLocks noGrp="1"/>
+          </p:cNvSpPr>
+          <p:nvPr>
+            <p:ph type="title"/>
+          </p:nvPr>
+        </p:nvSpPr>
+        <p:spPr/>
+        <p:txBody>
+          <a:bodyPr/>
+          <a:lstStyle/>
+          <a:p>
+            <a:r>
+              <a:rPr lang="en-US" dirty="0"/>
+              <a:t>Current Scans</a:t>
+            </a:r>
+          </a:p>
+        </p:txBody>
+      </p:sp>
+      <p:sp>
+        <p:nvSpPr>
+          <p:cNvPr id="6" name="TextBox 5">
+            <a:extLst>
+              <a:ext uri="{FF2B5EF4-FFF2-40B4-BE49-F238E27FC236}">
+                <a16:creationId xmlns:a16="http://schemas.microsoft.com/office/drawing/2014/main" id="{6185A402-E782-48FA-8E24-6243470DE4A8}"/>
+              </a:ext>
+            </a:extLst>
+          </p:cNvPr>
+          <p:cNvSpPr txBox="1"/>
+          <p:nvPr/>
+        </p:nvSpPr>
+        <p:spPr>
+          <a:xfrm>
+            <a:off x="6983048" y="1464881"/>
+            <a:ext cx="3969099" cy="276999"/>
+          </a:xfrm>
+          <a:prstGeom prst="rect">
+            <a:avLst/>
+          </a:prstGeom>
+          <a:noFill/>
+        </p:spPr>
+        <p:txBody>
+          <a:bodyPr wrap="square" lIns="0" tIns="0" rIns="0" bIns="0" rtlCol="0">
+            <a:spAutoFit/>
+          </a:bodyPr>
+          <a:lstStyle/>
+          <a:p>
+            <a:pPr algn="ctr" fontAlgn="base">
+              <a:spcBef>
+                <a:spcPct val="50000"/>
+              </a:spcBef>
+              <a:spcAft>
+                <a:spcPct val="0"/>
+              </a:spcAft>
+              <a:buClr>
+                <a:srgbClr val="F0AB00"/>
+              </a:buClr>
+              <a:buSzPct val="80000"/>
+            </a:pPr>
+            <a:r>
+              <a:rPr lang="en-US" sz="1800" u="sng" kern="0" dirty="0" err="1">
+                <a:ea typeface="Arial Unicode MS" pitchFamily="34" charset="-128"/>
+                <a:cs typeface="Arial Unicode MS" pitchFamily="34" charset="-128"/>
+              </a:rPr>
+              <a:t>Protecode</a:t>
+            </a:r>
+            <a:r>
+              <a:rPr lang="en-US" sz="1800" u="sng" kern="0" dirty="0">
+                <a:ea typeface="Arial Unicode MS" pitchFamily="34" charset="-128"/>
+                <a:cs typeface="Arial Unicode MS" pitchFamily="34" charset="-128"/>
+              </a:rPr>
+              <a:t> UI</a:t>
+            </a:r>
+          </a:p>
+        </p:txBody>
+      </p:sp>
     </p:spTree>
+    <p:extLst>
+      <p:ext uri="{BB962C8B-B14F-4D97-AF65-F5344CB8AC3E}">
+        <p14:creationId xmlns:p14="http://schemas.microsoft.com/office/powerpoint/2010/main" val="3159155407"/>
+      </p:ext>
+    </p:extLst>
   </p:cSld>
   <p:clrMapOvr>
     <a:masterClrMapping/>
   </p:clrMapOvr>
-  <p:transition spd="med"/>
+</p:sld>
+</file>
+
+<file path=ppt/slides/slide9.xml><?xml version="1.0" encoding="utf-8"?>
+<p:sld xmlns:a="http://schemas.openxmlformats.org/drawingml/2006/main" xmlns:r="http://schemas.openxmlformats.org/officeDocument/2006/relationships" xmlns:p="http://schemas.openxmlformats.org/presentationml/2006/main">
+  <p:cSld>
+    <p:spTree>
+      <p:nvGrpSpPr>
+        <p:cNvPr id="1" name=""/>
+        <p:cNvGrpSpPr/>
+        <p:nvPr/>
+      </p:nvGrpSpPr>
+      <p:grpSpPr>
+        <a:xfrm>
+          <a:off x="0" y="0"/>
+          <a:ext cx="0" cy="0"/>
+          <a:chOff x="0" y="0"/>
+          <a:chExt cx="0" cy="0"/>
+        </a:xfrm>
+      </p:grpSpPr>
+      <p:sp>
+        <p:nvSpPr>
+          <p:cNvPr id="4" name="Text Placeholder 3">
+            <a:extLst>
+              <a:ext uri="{FF2B5EF4-FFF2-40B4-BE49-F238E27FC236}">
+                <a16:creationId xmlns:a16="http://schemas.microsoft.com/office/drawing/2014/main" id="{6A2C2929-AE0A-4C9E-BDAD-5DAE4C1C3982}"/>
+              </a:ext>
+            </a:extLst>
+          </p:cNvPr>
+          <p:cNvSpPr>
+            <a:spLocks noGrp="1"/>
+          </p:cNvSpPr>
+          <p:nvPr>
+            <p:ph type="body" sz="quarter" idx="10"/>
+          </p:nvPr>
+        </p:nvSpPr>
+        <p:spPr>
+          <a:xfrm>
+            <a:off x="504000" y="1095375"/>
+            <a:ext cx="5477700" cy="5181600"/>
+          </a:xfrm>
+        </p:spPr>
+        <p:txBody>
+          <a:bodyPr/>
+          <a:lstStyle/>
+          <a:p>
+            <a:pPr>
+              <a:spcBef>
+                <a:spcPts val="200"/>
+              </a:spcBef>
+            </a:pPr>
+            <a:r>
+              <a:rPr lang="en-US" sz="1400" dirty="0">
+                <a:solidFill>
+                  <a:srgbClr val="FF0000"/>
+                </a:solidFill>
+              </a:rPr>
+              <a:t>FROM</a:t>
+            </a:r>
+            <a:r>
+              <a:rPr lang="en-US" sz="1400" dirty="0"/>
+              <a:t> maven:3.6-jdk-8-alpine as </a:t>
+            </a:r>
+            <a:r>
+              <a:rPr lang="en-US" sz="1400" dirty="0">
+                <a:solidFill>
+                  <a:schemeClr val="accent5">
+                    <a:lumMod val="75000"/>
+                  </a:schemeClr>
+                </a:solidFill>
+              </a:rPr>
+              <a:t>builder</a:t>
+            </a:r>
+          </a:p>
+          <a:p>
+            <a:pPr>
+              <a:spcBef>
+                <a:spcPts val="200"/>
+              </a:spcBef>
+            </a:pPr>
+            <a:r>
+              <a:rPr lang="en-US" sz="1400" dirty="0"/>
+              <a:t>WORKDIR /build</a:t>
+            </a:r>
+          </a:p>
+          <a:p>
+            <a:pPr>
+              <a:spcBef>
+                <a:spcPts val="200"/>
+              </a:spcBef>
+            </a:pPr>
+            <a:r>
+              <a:rPr lang="en-US" sz="1400" dirty="0"/>
+              <a:t>COPY </a:t>
+            </a:r>
+            <a:r>
+              <a:rPr lang="en-US" sz="1400" dirty="0" err="1"/>
+              <a:t>src</a:t>
+            </a:r>
+            <a:r>
+              <a:rPr lang="en-US" sz="1400" dirty="0"/>
+              <a:t> ./</a:t>
+            </a:r>
+            <a:r>
+              <a:rPr lang="en-US" sz="1400" dirty="0" err="1"/>
+              <a:t>src</a:t>
+            </a:r>
+            <a:endParaRPr lang="en-US" sz="1400" dirty="0"/>
+          </a:p>
+          <a:p>
+            <a:pPr>
+              <a:spcBef>
+                <a:spcPts val="200"/>
+              </a:spcBef>
+            </a:pPr>
+            <a:r>
+              <a:rPr lang="en-US" sz="1400" dirty="0"/>
+              <a:t>COPY pom.xml ./pom.xml</a:t>
+            </a:r>
+          </a:p>
+          <a:p>
+            <a:pPr>
+              <a:spcBef>
+                <a:spcPts val="200"/>
+              </a:spcBef>
+            </a:pPr>
+            <a:r>
+              <a:rPr lang="en-US" sz="1400" dirty="0"/>
+              <a:t>RUN </a:t>
+            </a:r>
+            <a:r>
+              <a:rPr lang="en-US" sz="1400" dirty="0" err="1"/>
+              <a:t>mvn</a:t>
+            </a:r>
+            <a:r>
+              <a:rPr lang="en-US" sz="1400" dirty="0"/>
+              <a:t> clean verify</a:t>
+            </a:r>
+          </a:p>
+          <a:p>
+            <a:pPr>
+              <a:spcBef>
+                <a:spcPts val="200"/>
+              </a:spcBef>
+            </a:pPr>
+            <a:endParaRPr lang="en-US" sz="1400" dirty="0"/>
+          </a:p>
+          <a:p>
+            <a:pPr>
+              <a:spcBef>
+                <a:spcPts val="200"/>
+              </a:spcBef>
+            </a:pPr>
+            <a:r>
+              <a:rPr lang="en-US" sz="1400" dirty="0">
+                <a:solidFill>
+                  <a:srgbClr val="FF0000"/>
+                </a:solidFill>
+              </a:rPr>
+              <a:t>FROM</a:t>
+            </a:r>
+            <a:r>
+              <a:rPr lang="en-US" sz="1400" dirty="0"/>
+              <a:t> </a:t>
+            </a:r>
+            <a:r>
+              <a:rPr lang="en-US" sz="1400" dirty="0" err="1"/>
+              <a:t>alpine:edge</a:t>
+            </a:r>
+            <a:r>
+              <a:rPr lang="en-US" sz="1400" dirty="0"/>
+              <a:t> as </a:t>
+            </a:r>
+            <a:r>
+              <a:rPr lang="en-US" sz="1400" dirty="0">
+                <a:solidFill>
+                  <a:schemeClr val="accent4">
+                    <a:lumMod val="75000"/>
+                  </a:schemeClr>
+                </a:solidFill>
+              </a:rPr>
+              <a:t>lib-container</a:t>
+            </a:r>
+          </a:p>
+          <a:p>
+            <a:pPr>
+              <a:spcBef>
+                <a:spcPts val="200"/>
+              </a:spcBef>
+            </a:pPr>
+            <a:r>
+              <a:rPr lang="en-US" sz="1400" dirty="0"/>
+              <a:t>RUN </a:t>
+            </a:r>
+            <a:r>
+              <a:rPr lang="en-US" sz="1400" dirty="0" err="1"/>
+              <a:t>apk</a:t>
+            </a:r>
+            <a:r>
+              <a:rPr lang="en-US" sz="1400" dirty="0"/>
+              <a:t> --no-cache add </a:t>
+            </a:r>
+            <a:r>
+              <a:rPr lang="en-US" sz="1400" dirty="0" err="1"/>
+              <a:t>openssl</a:t>
+            </a:r>
+            <a:r>
+              <a:rPr lang="en-US" sz="1400" dirty="0"/>
+              <a:t>=1.1.1d-r2 &amp;&amp; \</a:t>
+            </a:r>
+          </a:p>
+          <a:p>
+            <a:pPr>
+              <a:spcBef>
+                <a:spcPts val="200"/>
+              </a:spcBef>
+            </a:pPr>
+            <a:r>
+              <a:rPr lang="en-US" sz="1400" dirty="0"/>
+              <a:t>    </a:t>
+            </a:r>
+            <a:r>
+              <a:rPr lang="en-US" sz="1400" dirty="0" err="1"/>
+              <a:t>apk</a:t>
+            </a:r>
+            <a:r>
+              <a:rPr lang="en-US" sz="1400" dirty="0"/>
+              <a:t> --no-cache add libssl1.1=1.1.1d-r2 &amp;&amp; \</a:t>
+            </a:r>
+          </a:p>
+          <a:p>
+            <a:pPr>
+              <a:spcBef>
+                <a:spcPts val="200"/>
+              </a:spcBef>
+            </a:pPr>
+            <a:r>
+              <a:rPr lang="en-US" sz="1400" dirty="0"/>
+              <a:t>    </a:t>
+            </a:r>
+            <a:r>
+              <a:rPr lang="en-US" sz="1400" dirty="0" err="1"/>
+              <a:t>apk</a:t>
+            </a:r>
+            <a:r>
+              <a:rPr lang="en-US" sz="1400" dirty="0"/>
+              <a:t> --no-cache add libcrypto1.1=1.1.1d-r2 &amp;&amp; \</a:t>
+            </a:r>
+          </a:p>
+          <a:p>
+            <a:pPr>
+              <a:spcBef>
+                <a:spcPts val="200"/>
+              </a:spcBef>
+            </a:pPr>
+            <a:r>
+              <a:rPr lang="en-US" sz="1400" dirty="0"/>
+              <a:t>    </a:t>
+            </a:r>
+            <a:r>
+              <a:rPr lang="en-US" sz="1400" dirty="0" err="1"/>
+              <a:t>apk</a:t>
+            </a:r>
+            <a:r>
+              <a:rPr lang="en-US" sz="1400" dirty="0"/>
+              <a:t> --no-cache add </a:t>
+            </a:r>
+            <a:r>
+              <a:rPr lang="en-US" sz="1400" dirty="0" err="1"/>
+              <a:t>zlib</a:t>
+            </a:r>
+            <a:r>
+              <a:rPr lang="en-US" sz="1400" dirty="0"/>
+              <a:t>=1.2.11-r3</a:t>
+            </a:r>
+          </a:p>
+          <a:p>
+            <a:pPr>
+              <a:spcBef>
+                <a:spcPts val="200"/>
+              </a:spcBef>
+            </a:pPr>
+            <a:endParaRPr lang="en-US" sz="1400" dirty="0"/>
+          </a:p>
+          <a:p>
+            <a:pPr>
+              <a:spcBef>
+                <a:spcPts val="200"/>
+              </a:spcBef>
+            </a:pPr>
+            <a:r>
+              <a:rPr lang="en-US" sz="1400" dirty="0">
+                <a:solidFill>
+                  <a:srgbClr val="FF0000"/>
+                </a:solidFill>
+              </a:rPr>
+              <a:t>FROM</a:t>
+            </a:r>
+            <a:r>
+              <a:rPr lang="en-US" sz="1400" dirty="0"/>
+              <a:t> </a:t>
+            </a:r>
+            <a:r>
+              <a:rPr lang="en-US" sz="1400" dirty="0" err="1"/>
+              <a:t>azul</a:t>
+            </a:r>
+            <a:r>
+              <a:rPr lang="en-US" sz="1400" dirty="0"/>
+              <a:t>/zulu-openjdk-alpine:11 as </a:t>
+            </a:r>
+            <a:r>
+              <a:rPr lang="en-US" sz="1400" dirty="0" err="1">
+                <a:solidFill>
+                  <a:schemeClr val="accent6">
+                    <a:lumMod val="75000"/>
+                  </a:schemeClr>
+                </a:solidFill>
+              </a:rPr>
+              <a:t>jre</a:t>
+            </a:r>
+            <a:r>
+              <a:rPr lang="en-US" sz="1400" dirty="0">
+                <a:solidFill>
+                  <a:schemeClr val="accent6">
+                    <a:lumMod val="75000"/>
+                  </a:schemeClr>
+                </a:solidFill>
+              </a:rPr>
+              <a:t>-builder</a:t>
+            </a:r>
+          </a:p>
+          <a:p>
+            <a:pPr>
+              <a:spcBef>
+                <a:spcPts val="200"/>
+              </a:spcBef>
+            </a:pPr>
+            <a:r>
+              <a:rPr lang="en-US" sz="1400" dirty="0"/>
+              <a:t>RUN </a:t>
+            </a:r>
+            <a:r>
+              <a:rPr lang="en-US" sz="1400" dirty="0" err="1"/>
+              <a:t>jlink</a:t>
+            </a:r>
+            <a:r>
+              <a:rPr lang="en-US" sz="1400" dirty="0"/>
+              <a:t> \</a:t>
+            </a:r>
+          </a:p>
+          <a:p>
+            <a:pPr>
+              <a:spcBef>
+                <a:spcPts val="200"/>
+              </a:spcBef>
+            </a:pPr>
+            <a:r>
+              <a:rPr lang="en-US" sz="1400" dirty="0"/>
+              <a:t>    --add-modules java.base,java.logging,java.xml,jdk.unsupported,java.sql,java.naming,java.desktop,java.management,java.security.jgss,java.instrument \</a:t>
+            </a:r>
+          </a:p>
+          <a:p>
+            <a:pPr>
+              <a:spcBef>
+                <a:spcPts val="200"/>
+              </a:spcBef>
+            </a:pPr>
+            <a:r>
+              <a:rPr lang="en-US" sz="1400" dirty="0"/>
+              <a:t>    --verbose --strip-debug \</a:t>
+            </a:r>
+          </a:p>
+          <a:p>
+            <a:pPr>
+              <a:spcBef>
+                <a:spcPts val="200"/>
+              </a:spcBef>
+            </a:pPr>
+            <a:r>
+              <a:rPr lang="en-US" sz="1400" dirty="0"/>
+              <a:t>    --compress 2 --no-header-files \</a:t>
+            </a:r>
+          </a:p>
+          <a:p>
+            <a:pPr>
+              <a:spcBef>
+                <a:spcPts val="200"/>
+              </a:spcBef>
+            </a:pPr>
+            <a:r>
+              <a:rPr lang="en-US" sz="1400" dirty="0"/>
+              <a:t>    --no-man-pages --output /</a:t>
+            </a:r>
+            <a:r>
+              <a:rPr lang="en-US" sz="1400" dirty="0" err="1"/>
+              <a:t>jre</a:t>
+            </a:r>
+            <a:r>
+              <a:rPr lang="en-US" sz="1400" dirty="0"/>
+              <a:t> </a:t>
+            </a:r>
+          </a:p>
+          <a:p>
+            <a:pPr>
+              <a:spcBef>
+                <a:spcPts val="200"/>
+              </a:spcBef>
+            </a:pPr>
+            <a:endParaRPr lang="en-US" sz="1400" dirty="0"/>
+          </a:p>
+          <a:p>
+            <a:pPr>
+              <a:spcBef>
+                <a:spcPts val="200"/>
+              </a:spcBef>
+            </a:pPr>
+            <a:endParaRPr lang="en-US" sz="1400" dirty="0"/>
+          </a:p>
+          <a:p>
+            <a:endParaRPr lang="en-US" sz="1400" dirty="0"/>
+          </a:p>
+        </p:txBody>
+      </p:sp>
+      <p:sp>
+        <p:nvSpPr>
+          <p:cNvPr id="5" name="Text Placeholder 4">
+            <a:extLst>
+              <a:ext uri="{FF2B5EF4-FFF2-40B4-BE49-F238E27FC236}">
+                <a16:creationId xmlns:a16="http://schemas.microsoft.com/office/drawing/2014/main" id="{D20189EB-6BC1-48BB-BC3C-88C36DCDC279}"/>
+              </a:ext>
+            </a:extLst>
+          </p:cNvPr>
+          <p:cNvSpPr>
+            <a:spLocks noGrp="1"/>
+          </p:cNvSpPr>
+          <p:nvPr>
+            <p:ph type="body" sz="quarter" idx="11"/>
+          </p:nvPr>
+        </p:nvSpPr>
+        <p:spPr>
+          <a:xfrm>
+            <a:off x="6362477" y="1162050"/>
+            <a:ext cx="5328000" cy="4687950"/>
+          </a:xfrm>
+        </p:spPr>
+        <p:txBody>
+          <a:bodyPr/>
+          <a:lstStyle/>
+          <a:p>
+            <a:pPr>
+              <a:spcBef>
+                <a:spcPts val="200"/>
+              </a:spcBef>
+            </a:pPr>
+            <a:r>
+              <a:rPr lang="en-US" sz="1400" dirty="0"/>
+              <a:t>RUN </a:t>
+            </a:r>
+            <a:r>
+              <a:rPr lang="en-US" sz="1400" dirty="0" err="1"/>
+              <a:t>apk</a:t>
+            </a:r>
+            <a:r>
+              <a:rPr lang="en-US" sz="1400" dirty="0"/>
+              <a:t> --no-cache add </a:t>
+            </a:r>
+            <a:r>
+              <a:rPr lang="en-US" sz="1400" dirty="0" err="1"/>
+              <a:t>binutils</a:t>
+            </a:r>
+            <a:r>
+              <a:rPr lang="en-US" sz="1400" dirty="0"/>
+              <a:t>=2.32-r0 &amp;&amp; \</a:t>
+            </a:r>
+          </a:p>
+          <a:p>
+            <a:pPr>
+              <a:spcBef>
+                <a:spcPts val="200"/>
+              </a:spcBef>
+            </a:pPr>
+            <a:r>
+              <a:rPr lang="en-US" sz="1400" dirty="0"/>
+              <a:t>    strip -p --strip-unneeded jre/lib/server/libjvm.so </a:t>
+            </a:r>
+          </a:p>
+          <a:p>
+            <a:pPr>
+              <a:spcBef>
+                <a:spcPts val="200"/>
+              </a:spcBef>
+            </a:pPr>
+            <a:r>
+              <a:rPr lang="en-US" sz="1400" dirty="0"/>
+              <a:t>RUN rm jre/lib/libsplashscreen.so</a:t>
+            </a:r>
+          </a:p>
+          <a:p>
+            <a:pPr>
+              <a:spcBef>
+                <a:spcPts val="200"/>
+              </a:spcBef>
+            </a:pPr>
+            <a:endParaRPr lang="en-US" sz="1400" dirty="0"/>
+          </a:p>
+          <a:p>
+            <a:pPr>
+              <a:spcBef>
+                <a:spcPts val="200"/>
+              </a:spcBef>
+            </a:pPr>
+            <a:r>
+              <a:rPr lang="en-US" sz="1400" dirty="0">
+                <a:solidFill>
+                  <a:srgbClr val="FF0000"/>
+                </a:solidFill>
+              </a:rPr>
+              <a:t>FROM</a:t>
+            </a:r>
+            <a:r>
+              <a:rPr lang="en-US" sz="1400" dirty="0"/>
+              <a:t> scratch as </a:t>
+            </a:r>
+            <a:r>
+              <a:rPr lang="en-US" sz="1400" dirty="0" err="1"/>
+              <a:t>bulletinboard</a:t>
+            </a:r>
+            <a:r>
+              <a:rPr lang="en-US" sz="1400" dirty="0"/>
+              <a:t>-ads</a:t>
+            </a:r>
+          </a:p>
+          <a:p>
+            <a:pPr>
+              <a:spcBef>
+                <a:spcPts val="200"/>
+              </a:spcBef>
+            </a:pPr>
+            <a:r>
+              <a:rPr lang="en-US" sz="1400" dirty="0"/>
+              <a:t>COPY --from=</a:t>
+            </a:r>
+            <a:r>
+              <a:rPr lang="en-US" sz="1400" dirty="0">
+                <a:solidFill>
+                  <a:schemeClr val="accent4">
+                    <a:lumMod val="75000"/>
+                  </a:schemeClr>
+                </a:solidFill>
+              </a:rPr>
+              <a:t>lib-container</a:t>
+            </a:r>
+            <a:r>
+              <a:rPr lang="en-US" sz="1400" dirty="0"/>
+              <a:t> /lib/libz.so.1 /lib/libz.so.1</a:t>
+            </a:r>
+          </a:p>
+          <a:p>
+            <a:pPr>
+              <a:spcBef>
+                <a:spcPts val="200"/>
+              </a:spcBef>
+            </a:pPr>
+            <a:r>
+              <a:rPr lang="en-US" sz="1400" dirty="0"/>
+              <a:t>COPY --from=</a:t>
+            </a:r>
+            <a:r>
+              <a:rPr lang="en-US" sz="1400" dirty="0">
+                <a:solidFill>
+                  <a:schemeClr val="accent4">
+                    <a:lumMod val="75000"/>
+                  </a:schemeClr>
+                </a:solidFill>
+              </a:rPr>
+              <a:t>lib-container</a:t>
+            </a:r>
+            <a:r>
+              <a:rPr lang="en-US" sz="1400" dirty="0"/>
+              <a:t> /lib/ld-musl-x86_64.so.1 /lib/ld-musl-x86_64.so.1</a:t>
+            </a:r>
+          </a:p>
+          <a:p>
+            <a:pPr>
+              <a:spcBef>
+                <a:spcPts val="200"/>
+              </a:spcBef>
+            </a:pPr>
+            <a:endParaRPr lang="en-US" sz="1400" dirty="0"/>
+          </a:p>
+          <a:p>
+            <a:pPr>
+              <a:spcBef>
+                <a:spcPts val="200"/>
+              </a:spcBef>
+            </a:pPr>
+            <a:r>
+              <a:rPr lang="en-US" sz="1400" dirty="0"/>
+              <a:t>COPY --from=</a:t>
+            </a:r>
+            <a:r>
+              <a:rPr lang="en-US" sz="1400" dirty="0">
+                <a:solidFill>
+                  <a:schemeClr val="accent4">
+                    <a:lumMod val="75000"/>
+                  </a:schemeClr>
+                </a:solidFill>
+              </a:rPr>
+              <a:t>lib-container</a:t>
+            </a:r>
+            <a:r>
+              <a:rPr lang="en-US" sz="1400" dirty="0"/>
+              <a:t> /lib/libcrypto.so.1.1 /lib/libcrypto.so.1.1</a:t>
+            </a:r>
+          </a:p>
+          <a:p>
+            <a:pPr>
+              <a:spcBef>
+                <a:spcPts val="200"/>
+              </a:spcBef>
+            </a:pPr>
+            <a:r>
+              <a:rPr lang="en-US" sz="1400" dirty="0"/>
+              <a:t>COPY --from=</a:t>
+            </a:r>
+            <a:r>
+              <a:rPr lang="en-US" sz="1400" dirty="0">
+                <a:solidFill>
+                  <a:schemeClr val="accent4">
+                    <a:lumMod val="75000"/>
+                  </a:schemeClr>
+                </a:solidFill>
+              </a:rPr>
+              <a:t>lib-container</a:t>
+            </a:r>
+            <a:r>
+              <a:rPr lang="en-US" sz="1400" dirty="0"/>
+              <a:t> /lib/libc.musl-x86_64.so.1 /lib/libc.musl-x86_64.so.1</a:t>
+            </a:r>
+          </a:p>
+          <a:p>
+            <a:pPr>
+              <a:spcBef>
+                <a:spcPts val="200"/>
+              </a:spcBef>
+            </a:pPr>
+            <a:r>
+              <a:rPr lang="en-US" sz="1400" dirty="0"/>
+              <a:t>COPY --from=</a:t>
+            </a:r>
+            <a:r>
+              <a:rPr lang="en-US" sz="1400" dirty="0">
+                <a:solidFill>
+                  <a:schemeClr val="accent4">
+                    <a:lumMod val="75000"/>
+                  </a:schemeClr>
+                </a:solidFill>
+              </a:rPr>
+              <a:t>lib-container</a:t>
+            </a:r>
+            <a:r>
+              <a:rPr lang="en-US" sz="1400" dirty="0"/>
+              <a:t> /lib/libssl.so.1.1 /lib/libssl.so.1.1</a:t>
+            </a:r>
+          </a:p>
+          <a:p>
+            <a:pPr>
+              <a:spcBef>
+                <a:spcPts val="200"/>
+              </a:spcBef>
+            </a:pPr>
+            <a:endParaRPr lang="en-US" sz="1400" dirty="0"/>
+          </a:p>
+          <a:p>
+            <a:pPr>
+              <a:spcBef>
+                <a:spcPts val="200"/>
+              </a:spcBef>
+            </a:pPr>
+            <a:r>
+              <a:rPr lang="en-US" sz="1400" dirty="0"/>
+              <a:t>COPY --from=</a:t>
+            </a:r>
+            <a:r>
+              <a:rPr lang="en-US" sz="1400" dirty="0" err="1">
+                <a:solidFill>
+                  <a:schemeClr val="accent6">
+                    <a:lumMod val="75000"/>
+                  </a:schemeClr>
+                </a:solidFill>
+              </a:rPr>
+              <a:t>jre</a:t>
+            </a:r>
+            <a:r>
+              <a:rPr lang="en-US" sz="1400" dirty="0">
+                <a:solidFill>
+                  <a:schemeClr val="accent6">
+                    <a:lumMod val="75000"/>
+                  </a:schemeClr>
+                </a:solidFill>
+              </a:rPr>
+              <a:t>-builder</a:t>
+            </a:r>
+            <a:r>
+              <a:rPr lang="en-US" sz="1400" dirty="0"/>
+              <a:t> /</a:t>
+            </a:r>
+            <a:r>
+              <a:rPr lang="en-US" sz="1400" dirty="0" err="1"/>
+              <a:t>jre</a:t>
+            </a:r>
+            <a:r>
+              <a:rPr lang="en-US" sz="1400" dirty="0"/>
+              <a:t> </a:t>
+            </a:r>
+            <a:r>
+              <a:rPr lang="en-US" sz="1400" dirty="0" err="1"/>
+              <a:t>jre</a:t>
+            </a:r>
+            <a:endParaRPr lang="en-US" sz="1400" dirty="0"/>
+          </a:p>
+          <a:p>
+            <a:pPr>
+              <a:spcBef>
+                <a:spcPts val="200"/>
+              </a:spcBef>
+            </a:pPr>
+            <a:r>
+              <a:rPr lang="en-US" sz="1400" dirty="0"/>
+              <a:t>COPY --from=</a:t>
+            </a:r>
+            <a:r>
+              <a:rPr lang="en-US" sz="1400" dirty="0">
+                <a:solidFill>
+                  <a:schemeClr val="accent5">
+                    <a:lumMod val="75000"/>
+                  </a:schemeClr>
+                </a:solidFill>
+              </a:rPr>
+              <a:t>builder</a:t>
+            </a:r>
+            <a:r>
+              <a:rPr lang="en-US" sz="1400" dirty="0"/>
+              <a:t> /build/target/bulletinboard-ads-spring-boot-0.0.1.jar /</a:t>
+            </a:r>
+          </a:p>
+          <a:p>
+            <a:pPr>
+              <a:spcBef>
+                <a:spcPts val="200"/>
+              </a:spcBef>
+            </a:pPr>
+            <a:endParaRPr lang="en-US" sz="1400" dirty="0"/>
+          </a:p>
+          <a:p>
+            <a:pPr>
+              <a:spcBef>
+                <a:spcPts val="200"/>
+              </a:spcBef>
+            </a:pPr>
+            <a:r>
+              <a:rPr lang="en-US" sz="1400" dirty="0"/>
+              <a:t>CMD ["</a:t>
+            </a:r>
+            <a:r>
+              <a:rPr lang="en-US" sz="1400" dirty="0" err="1"/>
+              <a:t>jre</a:t>
+            </a:r>
+            <a:r>
+              <a:rPr lang="en-US" sz="1400" dirty="0"/>
+              <a:t>/bin/java","-Xmx768m", "-Xms512m", "-jar", "bulletinboard-ads-spring-boot-0.0.1.jar"]</a:t>
+            </a:r>
+          </a:p>
+        </p:txBody>
+      </p:sp>
+      <p:sp>
+        <p:nvSpPr>
+          <p:cNvPr id="3" name="Title 2">
+            <a:extLst>
+              <a:ext uri="{FF2B5EF4-FFF2-40B4-BE49-F238E27FC236}">
+                <a16:creationId xmlns:a16="http://schemas.microsoft.com/office/drawing/2014/main" id="{ED6931D2-7910-4652-A999-631C1CE8E029}"/>
+              </a:ext>
+            </a:extLst>
+          </p:cNvPr>
+          <p:cNvSpPr>
+            <a:spLocks noGrp="1"/>
+          </p:cNvSpPr>
+          <p:nvPr>
+            <p:ph type="title"/>
+          </p:nvPr>
+        </p:nvSpPr>
+        <p:spPr/>
+        <p:txBody>
+          <a:bodyPr/>
+          <a:lstStyle/>
+          <a:p>
+            <a:r>
+              <a:rPr lang="en-US" dirty="0"/>
+              <a:t>Current </a:t>
+            </a:r>
+            <a:r>
+              <a:rPr lang="en-US" dirty="0" err="1"/>
+              <a:t>Dockerfile</a:t>
+            </a:r>
+            <a:endParaRPr lang="en-US" dirty="0"/>
+          </a:p>
+        </p:txBody>
+      </p:sp>
+      <p:sp>
+        <p:nvSpPr>
+          <p:cNvPr id="6" name="Rectangle 5">
+            <a:extLst>
+              <a:ext uri="{FF2B5EF4-FFF2-40B4-BE49-F238E27FC236}">
+                <a16:creationId xmlns:a16="http://schemas.microsoft.com/office/drawing/2014/main" id="{86211D77-CB2C-45E0-9224-A8711B3E93AC}"/>
+              </a:ext>
+            </a:extLst>
+          </p:cNvPr>
+          <p:cNvSpPr/>
+          <p:nvPr/>
+        </p:nvSpPr>
+        <p:spPr bwMode="gray">
+          <a:xfrm>
+            <a:off x="381001" y="984354"/>
+            <a:ext cx="4143375" cy="1390650"/>
+          </a:xfrm>
+          <a:prstGeom prst="rect">
+            <a:avLst/>
+          </a:prstGeom>
+          <a:noFill/>
+          <a:ln w="38100" algn="ctr">
+            <a:solidFill>
+              <a:schemeClr val="tx1"/>
+            </a:solidFill>
+            <a:miter lim="800000"/>
+            <a:headEnd/>
+            <a:tailEnd/>
+          </a:ln>
+        </p:spPr>
+        <p:txBody>
+          <a:bodyPr lIns="90000" tIns="72000" rIns="90000" bIns="72000" rtlCol="0" anchor="ctr"/>
+          <a:lstStyle/>
+          <a:p>
+            <a:pPr marR="0" algn="ctr" defTabSz="914400" eaLnBrk="1" fontAlgn="base" latinLnBrk="0" hangingPunct="1">
+              <a:lnSpc>
+                <a:spcPct val="100000"/>
+              </a:lnSpc>
+              <a:spcBef>
+                <a:spcPct val="50000"/>
+              </a:spcBef>
+              <a:spcAft>
+                <a:spcPct val="0"/>
+              </a:spcAft>
+              <a:buClr>
+                <a:srgbClr val="F0AB00"/>
+              </a:buClr>
+              <a:buSzPct val="80000"/>
+              <a:tabLst/>
+            </a:pPr>
+            <a:endParaRPr kumimoji="0" lang="en-US" sz="1800" b="0" i="0" u="none" strike="noStrike" kern="0" cap="none" spc="0" normalizeH="0" baseline="0" noProof="0" dirty="0" err="1">
+              <a:ln>
+                <a:noFill/>
+              </a:ln>
+              <a:effectLst/>
+              <a:uLnTx/>
+              <a:uFillTx/>
+              <a:ea typeface="Arial Unicode MS" pitchFamily="34" charset="-128"/>
+              <a:cs typeface="Arial Unicode MS" pitchFamily="34" charset="-128"/>
+            </a:endParaRPr>
+          </a:p>
+        </p:txBody>
+      </p:sp>
+      <p:sp>
+        <p:nvSpPr>
+          <p:cNvPr id="7" name="Freeform: Shape 6">
+            <a:extLst>
+              <a:ext uri="{FF2B5EF4-FFF2-40B4-BE49-F238E27FC236}">
+                <a16:creationId xmlns:a16="http://schemas.microsoft.com/office/drawing/2014/main" id="{DD28690D-C318-4AB4-8512-0464D0A5EA63}"/>
+              </a:ext>
+            </a:extLst>
+          </p:cNvPr>
+          <p:cNvSpPr/>
+          <p:nvPr/>
+        </p:nvSpPr>
+        <p:spPr bwMode="gray">
+          <a:xfrm>
+            <a:off x="381000" y="828675"/>
+            <a:ext cx="10296525" cy="5210175"/>
+          </a:xfrm>
+          <a:custGeom>
+            <a:avLst/>
+            <a:gdLst>
+              <a:gd name="connsiteX0" fmla="*/ 0 w 10296525"/>
+              <a:gd name="connsiteY0" fmla="*/ 3028950 h 5210175"/>
+              <a:gd name="connsiteX1" fmla="*/ 19050 w 10296525"/>
+              <a:gd name="connsiteY1" fmla="*/ 5153025 h 5210175"/>
+              <a:gd name="connsiteX2" fmla="*/ 5753100 w 10296525"/>
+              <a:gd name="connsiteY2" fmla="*/ 5210175 h 5210175"/>
+              <a:gd name="connsiteX3" fmla="*/ 5753100 w 10296525"/>
+              <a:gd name="connsiteY3" fmla="*/ 1209675 h 5210175"/>
+              <a:gd name="connsiteX4" fmla="*/ 10296525 w 10296525"/>
+              <a:gd name="connsiteY4" fmla="*/ 1171575 h 5210175"/>
+              <a:gd name="connsiteX5" fmla="*/ 10296525 w 10296525"/>
+              <a:gd name="connsiteY5" fmla="*/ 0 h 5210175"/>
+              <a:gd name="connsiteX6" fmla="*/ 4991100 w 10296525"/>
+              <a:gd name="connsiteY6" fmla="*/ 0 h 5210175"/>
+              <a:gd name="connsiteX7" fmla="*/ 5000625 w 10296525"/>
+              <a:gd name="connsiteY7" fmla="*/ 2962275 h 5210175"/>
+              <a:gd name="connsiteX8" fmla="*/ 0 w 10296525"/>
+              <a:gd name="connsiteY8" fmla="*/ 3028950 h 5210175"/>
+              <a:gd name="connsiteX0" fmla="*/ 0 w 10296525"/>
+              <a:gd name="connsiteY0" fmla="*/ 3028950 h 5210175"/>
+              <a:gd name="connsiteX1" fmla="*/ 9525 w 10296525"/>
+              <a:gd name="connsiteY1" fmla="*/ 5181600 h 5210175"/>
+              <a:gd name="connsiteX2" fmla="*/ 5753100 w 10296525"/>
+              <a:gd name="connsiteY2" fmla="*/ 5210175 h 5210175"/>
+              <a:gd name="connsiteX3" fmla="*/ 5753100 w 10296525"/>
+              <a:gd name="connsiteY3" fmla="*/ 1209675 h 5210175"/>
+              <a:gd name="connsiteX4" fmla="*/ 10296525 w 10296525"/>
+              <a:gd name="connsiteY4" fmla="*/ 1171575 h 5210175"/>
+              <a:gd name="connsiteX5" fmla="*/ 10296525 w 10296525"/>
+              <a:gd name="connsiteY5" fmla="*/ 0 h 5210175"/>
+              <a:gd name="connsiteX6" fmla="*/ 4991100 w 10296525"/>
+              <a:gd name="connsiteY6" fmla="*/ 0 h 5210175"/>
+              <a:gd name="connsiteX7" fmla="*/ 5000625 w 10296525"/>
+              <a:gd name="connsiteY7" fmla="*/ 2962275 h 5210175"/>
+              <a:gd name="connsiteX8" fmla="*/ 0 w 10296525"/>
+              <a:gd name="connsiteY8" fmla="*/ 3028950 h 5210175"/>
+              <a:gd name="connsiteX0" fmla="*/ 0 w 10296525"/>
+              <a:gd name="connsiteY0" fmla="*/ 3028950 h 5210175"/>
+              <a:gd name="connsiteX1" fmla="*/ 9525 w 10296525"/>
+              <a:gd name="connsiteY1" fmla="*/ 5181600 h 5210175"/>
+              <a:gd name="connsiteX2" fmla="*/ 5753100 w 10296525"/>
+              <a:gd name="connsiteY2" fmla="*/ 5210175 h 5210175"/>
+              <a:gd name="connsiteX3" fmla="*/ 5753100 w 10296525"/>
+              <a:gd name="connsiteY3" fmla="*/ 1209675 h 5210175"/>
+              <a:gd name="connsiteX4" fmla="*/ 10296525 w 10296525"/>
+              <a:gd name="connsiteY4" fmla="*/ 1171575 h 5210175"/>
+              <a:gd name="connsiteX5" fmla="*/ 10296525 w 10296525"/>
+              <a:gd name="connsiteY5" fmla="*/ 0 h 5210175"/>
+              <a:gd name="connsiteX6" fmla="*/ 4991100 w 10296525"/>
+              <a:gd name="connsiteY6" fmla="*/ 0 h 5210175"/>
+              <a:gd name="connsiteX7" fmla="*/ 5000625 w 10296525"/>
+              <a:gd name="connsiteY7" fmla="*/ 3067050 h 5210175"/>
+              <a:gd name="connsiteX8" fmla="*/ 0 w 10296525"/>
+              <a:gd name="connsiteY8" fmla="*/ 3028950 h 5210175"/>
+              <a:gd name="connsiteX0" fmla="*/ 0 w 10296525"/>
+              <a:gd name="connsiteY0" fmla="*/ 3028950 h 5210175"/>
+              <a:gd name="connsiteX1" fmla="*/ 9525 w 10296525"/>
+              <a:gd name="connsiteY1" fmla="*/ 5181600 h 5210175"/>
+              <a:gd name="connsiteX2" fmla="*/ 5753100 w 10296525"/>
+              <a:gd name="connsiteY2" fmla="*/ 5210175 h 5210175"/>
+              <a:gd name="connsiteX3" fmla="*/ 5753100 w 10296525"/>
+              <a:gd name="connsiteY3" fmla="*/ 1209675 h 5210175"/>
+              <a:gd name="connsiteX4" fmla="*/ 10296525 w 10296525"/>
+              <a:gd name="connsiteY4" fmla="*/ 1171575 h 5210175"/>
+              <a:gd name="connsiteX5" fmla="*/ 10296525 w 10296525"/>
+              <a:gd name="connsiteY5" fmla="*/ 0 h 5210175"/>
+              <a:gd name="connsiteX6" fmla="*/ 4991100 w 10296525"/>
+              <a:gd name="connsiteY6" fmla="*/ 0 h 5210175"/>
+              <a:gd name="connsiteX7" fmla="*/ 5010150 w 10296525"/>
+              <a:gd name="connsiteY7" fmla="*/ 3038475 h 5210175"/>
+              <a:gd name="connsiteX8" fmla="*/ 0 w 10296525"/>
+              <a:gd name="connsiteY8" fmla="*/ 3028950 h 5210175"/>
+              <a:gd name="connsiteX0" fmla="*/ 0 w 10296525"/>
+              <a:gd name="connsiteY0" fmla="*/ 3028950 h 5210175"/>
+              <a:gd name="connsiteX1" fmla="*/ 9525 w 10296525"/>
+              <a:gd name="connsiteY1" fmla="*/ 5181600 h 5210175"/>
+              <a:gd name="connsiteX2" fmla="*/ 5753100 w 10296525"/>
+              <a:gd name="connsiteY2" fmla="*/ 5210175 h 5210175"/>
+              <a:gd name="connsiteX3" fmla="*/ 5753100 w 10296525"/>
+              <a:gd name="connsiteY3" fmla="*/ 1209675 h 5210175"/>
+              <a:gd name="connsiteX4" fmla="*/ 10296525 w 10296525"/>
+              <a:gd name="connsiteY4" fmla="*/ 1171575 h 5210175"/>
+              <a:gd name="connsiteX5" fmla="*/ 10296525 w 10296525"/>
+              <a:gd name="connsiteY5" fmla="*/ 0 h 5210175"/>
+              <a:gd name="connsiteX6" fmla="*/ 4991100 w 10296525"/>
+              <a:gd name="connsiteY6" fmla="*/ 0 h 5210175"/>
+              <a:gd name="connsiteX7" fmla="*/ 4991100 w 10296525"/>
+              <a:gd name="connsiteY7" fmla="*/ 3038475 h 5210175"/>
+              <a:gd name="connsiteX8" fmla="*/ 0 w 10296525"/>
+              <a:gd name="connsiteY8" fmla="*/ 3028950 h 5210175"/>
+              <a:gd name="connsiteX0" fmla="*/ 0 w 10296525"/>
+              <a:gd name="connsiteY0" fmla="*/ 3028950 h 5210175"/>
+              <a:gd name="connsiteX1" fmla="*/ 9525 w 10296525"/>
+              <a:gd name="connsiteY1" fmla="*/ 5191125 h 5210175"/>
+              <a:gd name="connsiteX2" fmla="*/ 5753100 w 10296525"/>
+              <a:gd name="connsiteY2" fmla="*/ 5210175 h 5210175"/>
+              <a:gd name="connsiteX3" fmla="*/ 5753100 w 10296525"/>
+              <a:gd name="connsiteY3" fmla="*/ 1209675 h 5210175"/>
+              <a:gd name="connsiteX4" fmla="*/ 10296525 w 10296525"/>
+              <a:gd name="connsiteY4" fmla="*/ 1171575 h 5210175"/>
+              <a:gd name="connsiteX5" fmla="*/ 10296525 w 10296525"/>
+              <a:gd name="connsiteY5" fmla="*/ 0 h 5210175"/>
+              <a:gd name="connsiteX6" fmla="*/ 4991100 w 10296525"/>
+              <a:gd name="connsiteY6" fmla="*/ 0 h 5210175"/>
+              <a:gd name="connsiteX7" fmla="*/ 4991100 w 10296525"/>
+              <a:gd name="connsiteY7" fmla="*/ 3038475 h 5210175"/>
+              <a:gd name="connsiteX8" fmla="*/ 0 w 10296525"/>
+              <a:gd name="connsiteY8" fmla="*/ 3028950 h 5210175"/>
+              <a:gd name="connsiteX0" fmla="*/ 0 w 10296525"/>
+              <a:gd name="connsiteY0" fmla="*/ 3028950 h 5210175"/>
+              <a:gd name="connsiteX1" fmla="*/ 9525 w 10296525"/>
+              <a:gd name="connsiteY1" fmla="*/ 5191125 h 5210175"/>
+              <a:gd name="connsiteX2" fmla="*/ 5753100 w 10296525"/>
+              <a:gd name="connsiteY2" fmla="*/ 5210175 h 5210175"/>
+              <a:gd name="connsiteX3" fmla="*/ 5753100 w 10296525"/>
+              <a:gd name="connsiteY3" fmla="*/ 1209675 h 5210175"/>
+              <a:gd name="connsiteX4" fmla="*/ 10296525 w 10296525"/>
+              <a:gd name="connsiteY4" fmla="*/ 1228725 h 5210175"/>
+              <a:gd name="connsiteX5" fmla="*/ 10296525 w 10296525"/>
+              <a:gd name="connsiteY5" fmla="*/ 0 h 5210175"/>
+              <a:gd name="connsiteX6" fmla="*/ 4991100 w 10296525"/>
+              <a:gd name="connsiteY6" fmla="*/ 0 h 5210175"/>
+              <a:gd name="connsiteX7" fmla="*/ 4991100 w 10296525"/>
+              <a:gd name="connsiteY7" fmla="*/ 3038475 h 5210175"/>
+              <a:gd name="connsiteX8" fmla="*/ 0 w 10296525"/>
+              <a:gd name="connsiteY8" fmla="*/ 3028950 h 5210175"/>
+              <a:gd name="connsiteX0" fmla="*/ 0 w 10306050"/>
+              <a:gd name="connsiteY0" fmla="*/ 3028950 h 5210175"/>
+              <a:gd name="connsiteX1" fmla="*/ 9525 w 10306050"/>
+              <a:gd name="connsiteY1" fmla="*/ 5191125 h 5210175"/>
+              <a:gd name="connsiteX2" fmla="*/ 5753100 w 10306050"/>
+              <a:gd name="connsiteY2" fmla="*/ 5210175 h 5210175"/>
+              <a:gd name="connsiteX3" fmla="*/ 5753100 w 10306050"/>
+              <a:gd name="connsiteY3" fmla="*/ 1209675 h 5210175"/>
+              <a:gd name="connsiteX4" fmla="*/ 10306050 w 10306050"/>
+              <a:gd name="connsiteY4" fmla="*/ 1219200 h 5210175"/>
+              <a:gd name="connsiteX5" fmla="*/ 10296525 w 10306050"/>
+              <a:gd name="connsiteY5" fmla="*/ 0 h 5210175"/>
+              <a:gd name="connsiteX6" fmla="*/ 4991100 w 10306050"/>
+              <a:gd name="connsiteY6" fmla="*/ 0 h 5210175"/>
+              <a:gd name="connsiteX7" fmla="*/ 4991100 w 10306050"/>
+              <a:gd name="connsiteY7" fmla="*/ 3038475 h 5210175"/>
+              <a:gd name="connsiteX8" fmla="*/ 0 w 10306050"/>
+              <a:gd name="connsiteY8" fmla="*/ 3028950 h 5210175"/>
+              <a:gd name="connsiteX0" fmla="*/ 0 w 10306050"/>
+              <a:gd name="connsiteY0" fmla="*/ 3028950 h 5210175"/>
+              <a:gd name="connsiteX1" fmla="*/ 9525 w 10306050"/>
+              <a:gd name="connsiteY1" fmla="*/ 5191125 h 5210175"/>
+              <a:gd name="connsiteX2" fmla="*/ 5753100 w 10306050"/>
+              <a:gd name="connsiteY2" fmla="*/ 5210175 h 5210175"/>
+              <a:gd name="connsiteX3" fmla="*/ 5753100 w 10306050"/>
+              <a:gd name="connsiteY3" fmla="*/ 1123950 h 5210175"/>
+              <a:gd name="connsiteX4" fmla="*/ 10306050 w 10306050"/>
+              <a:gd name="connsiteY4" fmla="*/ 1219200 h 5210175"/>
+              <a:gd name="connsiteX5" fmla="*/ 10296525 w 10306050"/>
+              <a:gd name="connsiteY5" fmla="*/ 0 h 5210175"/>
+              <a:gd name="connsiteX6" fmla="*/ 4991100 w 10306050"/>
+              <a:gd name="connsiteY6" fmla="*/ 0 h 5210175"/>
+              <a:gd name="connsiteX7" fmla="*/ 4991100 w 10306050"/>
+              <a:gd name="connsiteY7" fmla="*/ 3038475 h 5210175"/>
+              <a:gd name="connsiteX8" fmla="*/ 0 w 10306050"/>
+              <a:gd name="connsiteY8" fmla="*/ 3028950 h 5210175"/>
+              <a:gd name="connsiteX0" fmla="*/ 0 w 10296525"/>
+              <a:gd name="connsiteY0" fmla="*/ 3028950 h 5210175"/>
+              <a:gd name="connsiteX1" fmla="*/ 9525 w 10296525"/>
+              <a:gd name="connsiteY1" fmla="*/ 5191125 h 5210175"/>
+              <a:gd name="connsiteX2" fmla="*/ 5753100 w 10296525"/>
+              <a:gd name="connsiteY2" fmla="*/ 5210175 h 5210175"/>
+              <a:gd name="connsiteX3" fmla="*/ 5753100 w 10296525"/>
+              <a:gd name="connsiteY3" fmla="*/ 1123950 h 5210175"/>
+              <a:gd name="connsiteX4" fmla="*/ 10296525 w 10296525"/>
+              <a:gd name="connsiteY4" fmla="*/ 1123950 h 5210175"/>
+              <a:gd name="connsiteX5" fmla="*/ 10296525 w 10296525"/>
+              <a:gd name="connsiteY5" fmla="*/ 0 h 5210175"/>
+              <a:gd name="connsiteX6" fmla="*/ 4991100 w 10296525"/>
+              <a:gd name="connsiteY6" fmla="*/ 0 h 5210175"/>
+              <a:gd name="connsiteX7" fmla="*/ 4991100 w 10296525"/>
+              <a:gd name="connsiteY7" fmla="*/ 3038475 h 5210175"/>
+              <a:gd name="connsiteX8" fmla="*/ 0 w 10296525"/>
+              <a:gd name="connsiteY8" fmla="*/ 3028950 h 5210175"/>
+              <a:gd name="connsiteX0" fmla="*/ 0 w 10296525"/>
+              <a:gd name="connsiteY0" fmla="*/ 3028950 h 5210175"/>
+              <a:gd name="connsiteX1" fmla="*/ 9525 w 10296525"/>
+              <a:gd name="connsiteY1" fmla="*/ 5191125 h 5210175"/>
+              <a:gd name="connsiteX2" fmla="*/ 5753100 w 10296525"/>
+              <a:gd name="connsiteY2" fmla="*/ 5210175 h 5210175"/>
+              <a:gd name="connsiteX3" fmla="*/ 5753100 w 10296525"/>
+              <a:gd name="connsiteY3" fmla="*/ 1123950 h 5210175"/>
+              <a:gd name="connsiteX4" fmla="*/ 10296525 w 10296525"/>
+              <a:gd name="connsiteY4" fmla="*/ 1114425 h 5210175"/>
+              <a:gd name="connsiteX5" fmla="*/ 10296525 w 10296525"/>
+              <a:gd name="connsiteY5" fmla="*/ 0 h 5210175"/>
+              <a:gd name="connsiteX6" fmla="*/ 4991100 w 10296525"/>
+              <a:gd name="connsiteY6" fmla="*/ 0 h 5210175"/>
+              <a:gd name="connsiteX7" fmla="*/ 4991100 w 10296525"/>
+              <a:gd name="connsiteY7" fmla="*/ 3038475 h 5210175"/>
+              <a:gd name="connsiteX8" fmla="*/ 0 w 10296525"/>
+              <a:gd name="connsiteY8" fmla="*/ 3028950 h 5210175"/>
+            </a:gdLst>
+            <a:ahLst/>
+            <a:cxnLst>
+              <a:cxn ang="0">
+                <a:pos x="connsiteX0" y="connsiteY0"/>
+              </a:cxn>
+              <a:cxn ang="0">
+                <a:pos x="connsiteX1" y="connsiteY1"/>
+              </a:cxn>
+              <a:cxn ang="0">
+                <a:pos x="connsiteX2" y="connsiteY2"/>
+              </a:cxn>
+              <a:cxn ang="0">
+                <a:pos x="connsiteX3" y="connsiteY3"/>
+              </a:cxn>
+              <a:cxn ang="0">
+                <a:pos x="connsiteX4" y="connsiteY4"/>
+              </a:cxn>
+              <a:cxn ang="0">
+                <a:pos x="connsiteX5" y="connsiteY5"/>
+              </a:cxn>
+              <a:cxn ang="0">
+                <a:pos x="connsiteX6" y="connsiteY6"/>
+              </a:cxn>
+              <a:cxn ang="0">
+                <a:pos x="connsiteX7" y="connsiteY7"/>
+              </a:cxn>
+              <a:cxn ang="0">
+                <a:pos x="connsiteX8" y="connsiteY8"/>
+              </a:cxn>
+            </a:cxnLst>
+            <a:rect l="l" t="t" r="r" b="b"/>
+            <a:pathLst>
+              <a:path w="10296525" h="5210175">
+                <a:moveTo>
+                  <a:pt x="0" y="3028950"/>
+                </a:moveTo>
+                <a:lnTo>
+                  <a:pt x="9525" y="5191125"/>
+                </a:lnTo>
+                <a:lnTo>
+                  <a:pt x="5753100" y="5210175"/>
+                </a:lnTo>
+                <a:lnTo>
+                  <a:pt x="5753100" y="1123950"/>
+                </a:lnTo>
+                <a:lnTo>
+                  <a:pt x="10296525" y="1114425"/>
+                </a:lnTo>
+                <a:lnTo>
+                  <a:pt x="10296525" y="0"/>
+                </a:lnTo>
+                <a:lnTo>
+                  <a:pt x="4991100" y="0"/>
+                </a:lnTo>
+                <a:lnTo>
+                  <a:pt x="4991100" y="3038475"/>
+                </a:lnTo>
+                <a:lnTo>
+                  <a:pt x="0" y="3028950"/>
+                </a:lnTo>
+                <a:close/>
+              </a:path>
+            </a:pathLst>
+          </a:custGeom>
+          <a:noFill/>
+          <a:ln w="38100" algn="ctr">
+            <a:solidFill>
+              <a:schemeClr val="tx1"/>
+            </a:solidFill>
+            <a:miter lim="800000"/>
+            <a:headEnd/>
+            <a:tailEnd/>
+          </a:ln>
+        </p:spPr>
+        <p:txBody>
+          <a:bodyPr lIns="90000" tIns="72000" rIns="90000" bIns="72000" rtlCol="0" anchor="ctr"/>
+          <a:lstStyle/>
+          <a:p>
+            <a:pPr marR="0" algn="ctr" defTabSz="914400" eaLnBrk="1" fontAlgn="base" latinLnBrk="0" hangingPunct="1">
+              <a:lnSpc>
+                <a:spcPct val="100000"/>
+              </a:lnSpc>
+              <a:spcBef>
+                <a:spcPct val="50000"/>
+              </a:spcBef>
+              <a:spcAft>
+                <a:spcPct val="0"/>
+              </a:spcAft>
+              <a:buClr>
+                <a:srgbClr val="F0AB00"/>
+              </a:buClr>
+              <a:buSzPct val="80000"/>
+              <a:tabLst/>
+            </a:pPr>
+            <a:endParaRPr kumimoji="0" lang="en-US" sz="1800" b="0" i="0" u="none" strike="noStrike" kern="0" cap="none" spc="0" normalizeH="0" baseline="0" noProof="0" dirty="0" err="1">
+              <a:ln>
+                <a:noFill/>
+              </a:ln>
+              <a:effectLst/>
+              <a:uLnTx/>
+              <a:uFillTx/>
+              <a:ea typeface="Arial Unicode MS" pitchFamily="34" charset="-128"/>
+              <a:cs typeface="Arial Unicode MS" pitchFamily="34" charset="-128"/>
+            </a:endParaRPr>
+          </a:p>
+        </p:txBody>
+      </p:sp>
+      <p:sp>
+        <p:nvSpPr>
+          <p:cNvPr id="8" name="Rectangle 7">
+            <a:extLst>
+              <a:ext uri="{FF2B5EF4-FFF2-40B4-BE49-F238E27FC236}">
+                <a16:creationId xmlns:a16="http://schemas.microsoft.com/office/drawing/2014/main" id="{B0064B96-B2AE-455F-BF70-1737450ABCE1}"/>
+              </a:ext>
+            </a:extLst>
+          </p:cNvPr>
+          <p:cNvSpPr/>
+          <p:nvPr/>
+        </p:nvSpPr>
+        <p:spPr bwMode="gray">
+          <a:xfrm>
+            <a:off x="381001" y="2466975"/>
+            <a:ext cx="4143375" cy="1295400"/>
+          </a:xfrm>
+          <a:prstGeom prst="rect">
+            <a:avLst/>
+          </a:prstGeom>
+          <a:noFill/>
+          <a:ln w="38100" algn="ctr">
+            <a:solidFill>
+              <a:schemeClr val="tx1"/>
+            </a:solidFill>
+            <a:miter lim="800000"/>
+            <a:headEnd/>
+            <a:tailEnd/>
+          </a:ln>
+        </p:spPr>
+        <p:txBody>
+          <a:bodyPr lIns="90000" tIns="72000" rIns="90000" bIns="72000" rtlCol="0" anchor="ctr"/>
+          <a:lstStyle/>
+          <a:p>
+            <a:pPr marR="0" algn="ctr" defTabSz="914400" eaLnBrk="1" fontAlgn="base" latinLnBrk="0" hangingPunct="1">
+              <a:lnSpc>
+                <a:spcPct val="100000"/>
+              </a:lnSpc>
+              <a:spcBef>
+                <a:spcPct val="50000"/>
+              </a:spcBef>
+              <a:spcAft>
+                <a:spcPct val="0"/>
+              </a:spcAft>
+              <a:buClr>
+                <a:srgbClr val="F0AB00"/>
+              </a:buClr>
+              <a:buSzPct val="80000"/>
+              <a:tabLst/>
+            </a:pPr>
+            <a:endParaRPr kumimoji="0" lang="en-US" sz="1800" b="0" i="0" u="none" strike="noStrike" kern="0" cap="none" spc="0" normalizeH="0" baseline="0" noProof="0" dirty="0" err="1">
+              <a:ln>
+                <a:noFill/>
+              </a:ln>
+              <a:effectLst/>
+              <a:uLnTx/>
+              <a:uFillTx/>
+              <a:ea typeface="Arial Unicode MS" pitchFamily="34" charset="-128"/>
+              <a:cs typeface="Arial Unicode MS" pitchFamily="34" charset="-128"/>
+            </a:endParaRPr>
+          </a:p>
+        </p:txBody>
+      </p:sp>
+      <p:sp>
+        <p:nvSpPr>
+          <p:cNvPr id="9" name="Rectangle 8">
+            <a:extLst>
+              <a:ext uri="{FF2B5EF4-FFF2-40B4-BE49-F238E27FC236}">
+                <a16:creationId xmlns:a16="http://schemas.microsoft.com/office/drawing/2014/main" id="{C3EA81D5-4103-43C8-9562-6CD54C93F48A}"/>
+              </a:ext>
+            </a:extLst>
+          </p:cNvPr>
+          <p:cNvSpPr/>
+          <p:nvPr/>
+        </p:nvSpPr>
+        <p:spPr bwMode="gray">
+          <a:xfrm>
+            <a:off x="6262688" y="2038350"/>
+            <a:ext cx="5662612" cy="4000500"/>
+          </a:xfrm>
+          <a:prstGeom prst="rect">
+            <a:avLst/>
+          </a:prstGeom>
+          <a:noFill/>
+          <a:ln w="38100" algn="ctr">
+            <a:solidFill>
+              <a:schemeClr val="tx1"/>
+            </a:solidFill>
+            <a:miter lim="800000"/>
+            <a:headEnd/>
+            <a:tailEnd/>
+          </a:ln>
+        </p:spPr>
+        <p:txBody>
+          <a:bodyPr lIns="90000" tIns="72000" rIns="90000" bIns="72000" rtlCol="0" anchor="ctr"/>
+          <a:lstStyle/>
+          <a:p>
+            <a:pPr marR="0" algn="ctr" defTabSz="914400" eaLnBrk="1" fontAlgn="base" latinLnBrk="0" hangingPunct="1">
+              <a:lnSpc>
+                <a:spcPct val="100000"/>
+              </a:lnSpc>
+              <a:spcBef>
+                <a:spcPct val="50000"/>
+              </a:spcBef>
+              <a:spcAft>
+                <a:spcPct val="0"/>
+              </a:spcAft>
+              <a:buClr>
+                <a:srgbClr val="F0AB00"/>
+              </a:buClr>
+              <a:buSzPct val="80000"/>
+              <a:tabLst/>
+            </a:pPr>
+            <a:endParaRPr kumimoji="0" lang="en-US" sz="1800" b="0" i="0" u="none" strike="noStrike" kern="0" cap="none" spc="0" normalizeH="0" baseline="0" noProof="0" dirty="0" err="1">
+              <a:ln>
+                <a:noFill/>
+              </a:ln>
+              <a:effectLst/>
+              <a:uLnTx/>
+              <a:uFillTx/>
+              <a:ea typeface="Arial Unicode MS" pitchFamily="34" charset="-128"/>
+              <a:cs typeface="Arial Unicode MS" pitchFamily="34" charset="-128"/>
+            </a:endParaRPr>
+          </a:p>
+        </p:txBody>
+      </p:sp>
+      <p:sp>
+        <p:nvSpPr>
+          <p:cNvPr id="10" name="Speech Bubble: Rectangle 9">
+            <a:extLst>
+              <a:ext uri="{FF2B5EF4-FFF2-40B4-BE49-F238E27FC236}">
+                <a16:creationId xmlns:a16="http://schemas.microsoft.com/office/drawing/2014/main" id="{0402B791-7C6F-46C7-B77B-B8C4D06836BD}"/>
+              </a:ext>
+            </a:extLst>
+          </p:cNvPr>
+          <p:cNvSpPr/>
+          <p:nvPr/>
+        </p:nvSpPr>
+        <p:spPr bwMode="gray">
+          <a:xfrm>
+            <a:off x="5010151" y="1162050"/>
+            <a:ext cx="3448050" cy="1495425"/>
+          </a:xfrm>
+          <a:prstGeom prst="wedgeRectCallout">
+            <a:avLst>
+              <a:gd name="adj1" fmla="val -62611"/>
+              <a:gd name="adj2" fmla="val -13667"/>
+            </a:avLst>
+          </a:prstGeom>
+          <a:solidFill>
+            <a:schemeClr val="bg1"/>
+          </a:solidFill>
+          <a:ln w="38100" algn="ctr">
+            <a:solidFill>
+              <a:schemeClr val="tx1"/>
+            </a:solidFill>
+            <a:miter lim="800000"/>
+            <a:headEnd/>
+            <a:tailEnd/>
+          </a:ln>
+        </p:spPr>
+        <p:txBody>
+          <a:bodyPr lIns="90000" tIns="72000" rIns="90000" bIns="72000" rtlCol="0" anchor="ctr"/>
+          <a:lstStyle/>
+          <a:p>
+            <a:pPr marR="0" algn="ctr" defTabSz="914400" eaLnBrk="1" fontAlgn="base" latinLnBrk="0" hangingPunct="1">
+              <a:lnSpc>
+                <a:spcPct val="100000"/>
+              </a:lnSpc>
+              <a:spcBef>
+                <a:spcPct val="50000"/>
+              </a:spcBef>
+              <a:spcAft>
+                <a:spcPct val="0"/>
+              </a:spcAft>
+              <a:buClr>
+                <a:srgbClr val="F0AB00"/>
+              </a:buClr>
+              <a:buSzPct val="80000"/>
+              <a:tabLst/>
+            </a:pPr>
+            <a:r>
+              <a:rPr kumimoji="0" lang="en-US" sz="1800" b="0" i="0" u="none" strike="noStrike" kern="0" cap="none" spc="0" normalizeH="0" baseline="0" noProof="0" dirty="0">
+                <a:ln>
+                  <a:noFill/>
+                </a:ln>
+                <a:effectLst/>
+                <a:uLnTx/>
+                <a:uFillTx/>
+                <a:ea typeface="Arial Unicode MS" pitchFamily="34" charset="-128"/>
+                <a:cs typeface="Arial Unicode MS" pitchFamily="34" charset="-128"/>
+              </a:rPr>
+              <a:t>Builds Java Application</a:t>
+            </a:r>
+            <a:br>
+              <a:rPr kumimoji="0" lang="en-US" sz="1800" b="0" i="0" u="none" strike="noStrike" kern="0" cap="none" spc="0" normalizeH="0" baseline="0" noProof="0" dirty="0">
+                <a:ln>
+                  <a:noFill/>
+                </a:ln>
+                <a:effectLst/>
+                <a:uLnTx/>
+                <a:uFillTx/>
+                <a:ea typeface="Arial Unicode MS" pitchFamily="34" charset="-128"/>
+                <a:cs typeface="Arial Unicode MS" pitchFamily="34" charset="-128"/>
+              </a:rPr>
+            </a:br>
+            <a:r>
+              <a:rPr kumimoji="0" lang="en-US" sz="1800" b="0" i="0" u="none" strike="noStrike" kern="0" cap="none" spc="0" normalizeH="0" baseline="0" noProof="0" dirty="0">
+                <a:ln>
+                  <a:noFill/>
+                </a:ln>
+                <a:effectLst/>
+                <a:uLnTx/>
+                <a:uFillTx/>
+                <a:ea typeface="Arial Unicode MS" pitchFamily="34" charset="-128"/>
+                <a:cs typeface="Arial Unicode MS" pitchFamily="34" charset="-128"/>
+              </a:rPr>
+              <a:t>w</a:t>
+            </a:r>
+            <a:r>
+              <a:rPr lang="en-US" sz="1800" kern="0" dirty="0" err="1">
+                <a:ea typeface="Arial Unicode MS" pitchFamily="34" charset="-128"/>
+                <a:cs typeface="Arial Unicode MS" pitchFamily="34" charset="-128"/>
+              </a:rPr>
+              <a:t>ith</a:t>
+            </a:r>
+            <a:r>
+              <a:rPr lang="en-US" sz="1800" kern="0" dirty="0">
+                <a:ea typeface="Arial Unicode MS" pitchFamily="34" charset="-128"/>
+                <a:cs typeface="Arial Unicode MS" pitchFamily="34" charset="-128"/>
+              </a:rPr>
+              <a:t> Maven</a:t>
+            </a:r>
+            <a:br>
+              <a:rPr lang="en-US" sz="1800" kern="0" dirty="0">
+                <a:ea typeface="Arial Unicode MS" pitchFamily="34" charset="-128"/>
+                <a:cs typeface="Arial Unicode MS" pitchFamily="34" charset="-128"/>
+              </a:rPr>
+            </a:br>
+            <a:r>
+              <a:rPr lang="en-US" sz="1800" kern="0" dirty="0">
+                <a:ea typeface="Arial Unicode MS" pitchFamily="34" charset="-128"/>
+                <a:cs typeface="Arial Unicode MS" pitchFamily="34" charset="-128"/>
+              </a:rPr>
+              <a:t>(always loads all dependencies)</a:t>
+            </a:r>
+            <a:endParaRPr kumimoji="0" lang="en-US" sz="1800" b="0" i="0" u="none" strike="noStrike" kern="0" cap="none" spc="0" normalizeH="0" baseline="0" noProof="0" dirty="0" err="1">
+              <a:ln>
+                <a:noFill/>
+              </a:ln>
+              <a:effectLst/>
+              <a:uLnTx/>
+              <a:uFillTx/>
+              <a:ea typeface="Arial Unicode MS" pitchFamily="34" charset="-128"/>
+              <a:cs typeface="Arial Unicode MS" pitchFamily="34" charset="-128"/>
+            </a:endParaRPr>
+          </a:p>
+        </p:txBody>
+      </p:sp>
+      <p:sp>
+        <p:nvSpPr>
+          <p:cNvPr id="11" name="Speech Bubble: Rectangle 10">
+            <a:extLst>
+              <a:ext uri="{FF2B5EF4-FFF2-40B4-BE49-F238E27FC236}">
+                <a16:creationId xmlns:a16="http://schemas.microsoft.com/office/drawing/2014/main" id="{2525499A-8363-49D8-B89E-116FF2327252}"/>
+              </a:ext>
+            </a:extLst>
+          </p:cNvPr>
+          <p:cNvSpPr/>
+          <p:nvPr/>
+        </p:nvSpPr>
+        <p:spPr bwMode="gray">
+          <a:xfrm>
+            <a:off x="5010151" y="2543175"/>
+            <a:ext cx="3448050" cy="1495425"/>
+          </a:xfrm>
+          <a:prstGeom prst="wedgeRectCallout">
+            <a:avLst>
+              <a:gd name="adj1" fmla="val -62611"/>
+              <a:gd name="adj2" fmla="val -13667"/>
+            </a:avLst>
+          </a:prstGeom>
+          <a:solidFill>
+            <a:schemeClr val="bg1"/>
+          </a:solidFill>
+          <a:ln w="38100" algn="ctr">
+            <a:solidFill>
+              <a:schemeClr val="tx1"/>
+            </a:solidFill>
+            <a:miter lim="800000"/>
+            <a:headEnd/>
+            <a:tailEnd/>
+          </a:ln>
+        </p:spPr>
+        <p:txBody>
+          <a:bodyPr lIns="90000" tIns="72000" rIns="90000" bIns="72000" rtlCol="0" anchor="ctr"/>
+          <a:lstStyle/>
+          <a:p>
+            <a:pPr marR="0" algn="ctr" defTabSz="914400" eaLnBrk="1" fontAlgn="base" latinLnBrk="0" hangingPunct="1">
+              <a:lnSpc>
+                <a:spcPct val="100000"/>
+              </a:lnSpc>
+              <a:spcBef>
+                <a:spcPct val="50000"/>
+              </a:spcBef>
+              <a:spcAft>
+                <a:spcPct val="0"/>
+              </a:spcAft>
+              <a:buClr>
+                <a:srgbClr val="F0AB00"/>
+              </a:buClr>
+              <a:buSzPct val="80000"/>
+              <a:tabLst/>
+            </a:pPr>
+            <a:r>
+              <a:rPr kumimoji="0" lang="en-US" sz="1800" b="0" i="0" u="none" strike="noStrike" kern="0" cap="none" spc="0" normalizeH="0" baseline="0" noProof="0" dirty="0">
+                <a:ln>
+                  <a:noFill/>
+                </a:ln>
+                <a:effectLst/>
+                <a:uLnTx/>
+                <a:uFillTx/>
+                <a:ea typeface="Arial Unicode MS" pitchFamily="34" charset="-128"/>
+                <a:cs typeface="Arial Unicode MS" pitchFamily="34" charset="-128"/>
+              </a:rPr>
+              <a:t>Provides latest libraries </a:t>
+            </a:r>
+            <a:br>
+              <a:rPr kumimoji="0" lang="en-US" sz="1800" b="0" i="0" u="none" strike="noStrike" kern="0" cap="none" spc="0" normalizeH="0" baseline="0" noProof="0" dirty="0">
+                <a:ln>
+                  <a:noFill/>
+                </a:ln>
+                <a:effectLst/>
+                <a:uLnTx/>
+                <a:uFillTx/>
+                <a:ea typeface="Arial Unicode MS" pitchFamily="34" charset="-128"/>
+                <a:cs typeface="Arial Unicode MS" pitchFamily="34" charset="-128"/>
+              </a:rPr>
+            </a:br>
+            <a:r>
+              <a:rPr kumimoji="0" lang="en-US" sz="1800" b="0" i="0" u="none" strike="noStrike" kern="0" cap="none" spc="0" normalizeH="0" baseline="0" noProof="0" dirty="0">
+                <a:ln>
+                  <a:noFill/>
+                </a:ln>
+                <a:effectLst/>
+                <a:uLnTx/>
+                <a:uFillTx/>
+                <a:ea typeface="Arial Unicode MS" pitchFamily="34" charset="-128"/>
+                <a:cs typeface="Arial Unicode MS" pitchFamily="34" charset="-128"/>
+              </a:rPr>
+              <a:t>needed yet not provided by</a:t>
+            </a:r>
+            <a:br>
+              <a:rPr lang="en-US" sz="1800" kern="0" dirty="0">
+                <a:ea typeface="Arial Unicode MS" pitchFamily="34" charset="-128"/>
+                <a:cs typeface="Arial Unicode MS" pitchFamily="34" charset="-128"/>
+              </a:rPr>
+            </a:br>
+            <a:r>
+              <a:rPr lang="en-US" sz="1800" kern="0" dirty="0">
+                <a:ea typeface="Arial Unicode MS" pitchFamily="34" charset="-128"/>
+                <a:cs typeface="Arial Unicode MS" pitchFamily="34" charset="-128"/>
+              </a:rPr>
+              <a:t>Java Runtime Builder</a:t>
+            </a:r>
+            <a:endParaRPr kumimoji="0" lang="en-US" sz="1800" b="0" i="0" u="none" strike="noStrike" kern="0" cap="none" spc="0" normalizeH="0" baseline="0" noProof="0" dirty="0">
+              <a:ln>
+                <a:noFill/>
+              </a:ln>
+              <a:effectLst/>
+              <a:uLnTx/>
+              <a:uFillTx/>
+              <a:ea typeface="Arial Unicode MS" pitchFamily="34" charset="-128"/>
+              <a:cs typeface="Arial Unicode MS" pitchFamily="34" charset="-128"/>
+            </a:endParaRPr>
+          </a:p>
+        </p:txBody>
+      </p:sp>
+      <p:sp>
+        <p:nvSpPr>
+          <p:cNvPr id="12" name="Speech Bubble: Rectangle 11">
+            <a:extLst>
+              <a:ext uri="{FF2B5EF4-FFF2-40B4-BE49-F238E27FC236}">
+                <a16:creationId xmlns:a16="http://schemas.microsoft.com/office/drawing/2014/main" id="{61435BEB-77D2-40E0-A094-CF48AA8AF531}"/>
+              </a:ext>
+            </a:extLst>
+          </p:cNvPr>
+          <p:cNvSpPr/>
+          <p:nvPr/>
+        </p:nvSpPr>
+        <p:spPr bwMode="gray">
+          <a:xfrm>
+            <a:off x="1266715" y="1556925"/>
+            <a:ext cx="3448050" cy="1495425"/>
+          </a:xfrm>
+          <a:prstGeom prst="wedgeRectCallout">
+            <a:avLst>
+              <a:gd name="adj1" fmla="val 68881"/>
+              <a:gd name="adj2" fmla="val -13030"/>
+            </a:avLst>
+          </a:prstGeom>
+          <a:solidFill>
+            <a:schemeClr val="bg1"/>
+          </a:solidFill>
+          <a:ln w="38100" algn="ctr">
+            <a:solidFill>
+              <a:schemeClr val="tx1"/>
+            </a:solidFill>
+            <a:miter lim="800000"/>
+            <a:headEnd/>
+            <a:tailEnd/>
+          </a:ln>
+        </p:spPr>
+        <p:txBody>
+          <a:bodyPr lIns="90000" tIns="72000" rIns="90000" bIns="72000" rtlCol="0" anchor="ctr"/>
+          <a:lstStyle/>
+          <a:p>
+            <a:pPr marR="0" algn="ctr" defTabSz="914400" eaLnBrk="1" fontAlgn="base" latinLnBrk="0" hangingPunct="1">
+              <a:lnSpc>
+                <a:spcPct val="100000"/>
+              </a:lnSpc>
+              <a:spcBef>
+                <a:spcPct val="50000"/>
+              </a:spcBef>
+              <a:spcAft>
+                <a:spcPct val="0"/>
+              </a:spcAft>
+              <a:buClr>
+                <a:srgbClr val="F0AB00"/>
+              </a:buClr>
+              <a:buSzPct val="80000"/>
+              <a:tabLst/>
+            </a:pPr>
+            <a:r>
+              <a:rPr lang="en-US" sz="1800" kern="0" dirty="0">
+                <a:ea typeface="Arial Unicode MS" pitchFamily="34" charset="-128"/>
+                <a:cs typeface="Arial Unicode MS" pitchFamily="34" charset="-128"/>
+              </a:rPr>
+              <a:t>Creates custom Java 11</a:t>
+            </a:r>
+            <a:br>
+              <a:rPr lang="en-US" sz="1800" kern="0" dirty="0">
+                <a:ea typeface="Arial Unicode MS" pitchFamily="34" charset="-128"/>
+                <a:cs typeface="Arial Unicode MS" pitchFamily="34" charset="-128"/>
+              </a:rPr>
+            </a:br>
+            <a:r>
+              <a:rPr kumimoji="0" lang="en-US" sz="1800" b="0" i="0" u="none" strike="noStrike" kern="0" cap="none" spc="0" normalizeH="0" baseline="0" noProof="0" dirty="0">
+                <a:ln>
+                  <a:noFill/>
+                </a:ln>
+                <a:effectLst/>
+                <a:uLnTx/>
+                <a:uFillTx/>
+                <a:ea typeface="Arial Unicode MS" pitchFamily="34" charset="-128"/>
+                <a:cs typeface="Arial Unicode MS" pitchFamily="34" charset="-128"/>
+              </a:rPr>
+              <a:t>Runtime Environment</a:t>
+            </a:r>
+          </a:p>
+        </p:txBody>
+      </p:sp>
+      <p:sp>
+        <p:nvSpPr>
+          <p:cNvPr id="13" name="Speech Bubble: Rectangle 12">
+            <a:extLst>
+              <a:ext uri="{FF2B5EF4-FFF2-40B4-BE49-F238E27FC236}">
+                <a16:creationId xmlns:a16="http://schemas.microsoft.com/office/drawing/2014/main" id="{53DAA8CE-493C-4B0F-8D1D-BF95EFCCB4A9}"/>
+              </a:ext>
+            </a:extLst>
+          </p:cNvPr>
+          <p:cNvSpPr/>
+          <p:nvPr/>
+        </p:nvSpPr>
+        <p:spPr bwMode="gray">
+          <a:xfrm>
+            <a:off x="2081212" y="4260643"/>
+            <a:ext cx="3448050" cy="1495425"/>
+          </a:xfrm>
+          <a:prstGeom prst="wedgeRectCallout">
+            <a:avLst>
+              <a:gd name="adj1" fmla="val 69433"/>
+              <a:gd name="adj2" fmla="val -49336"/>
+            </a:avLst>
+          </a:prstGeom>
+          <a:solidFill>
+            <a:schemeClr val="bg1"/>
+          </a:solidFill>
+          <a:ln w="38100" algn="ctr">
+            <a:solidFill>
+              <a:schemeClr val="tx1"/>
+            </a:solidFill>
+            <a:miter lim="800000"/>
+            <a:headEnd/>
+            <a:tailEnd/>
+          </a:ln>
+        </p:spPr>
+        <p:txBody>
+          <a:bodyPr lIns="90000" tIns="72000" rIns="90000" bIns="72000" rtlCol="0" anchor="ctr"/>
+          <a:lstStyle/>
+          <a:p>
+            <a:pPr marR="0" algn="ctr" defTabSz="914400" eaLnBrk="1" fontAlgn="base" latinLnBrk="0" hangingPunct="1">
+              <a:lnSpc>
+                <a:spcPct val="100000"/>
+              </a:lnSpc>
+              <a:spcBef>
+                <a:spcPct val="50000"/>
+              </a:spcBef>
+              <a:spcAft>
+                <a:spcPct val="0"/>
+              </a:spcAft>
+              <a:buClr>
+                <a:srgbClr val="F0AB00"/>
+              </a:buClr>
+              <a:buSzPct val="80000"/>
+              <a:tabLst/>
+            </a:pPr>
+            <a:r>
+              <a:rPr lang="en-US" sz="1800" kern="0" dirty="0">
+                <a:ea typeface="Arial Unicode MS" pitchFamily="34" charset="-128"/>
+                <a:cs typeface="Arial Unicode MS" pitchFamily="34" charset="-128"/>
+              </a:rPr>
+              <a:t>Accumulates all parts</a:t>
+            </a:r>
+            <a:br>
+              <a:rPr lang="en-US" sz="1800" kern="0" dirty="0">
+                <a:ea typeface="Arial Unicode MS" pitchFamily="34" charset="-128"/>
+                <a:cs typeface="Arial Unicode MS" pitchFamily="34" charset="-128"/>
+              </a:rPr>
+            </a:br>
+            <a:r>
+              <a:rPr lang="en-US" sz="1800" kern="0" dirty="0">
+                <a:ea typeface="Arial Unicode MS" pitchFamily="34" charset="-128"/>
+                <a:cs typeface="Arial Unicode MS" pitchFamily="34" charset="-128"/>
+              </a:rPr>
+              <a:t>Builds from scratch</a:t>
+            </a:r>
+            <a:br>
+              <a:rPr lang="en-US" sz="1800" kern="0" dirty="0">
+                <a:ea typeface="Arial Unicode MS" pitchFamily="34" charset="-128"/>
+                <a:cs typeface="Arial Unicode MS" pitchFamily="34" charset="-128"/>
+              </a:rPr>
+            </a:br>
+            <a:r>
+              <a:rPr lang="en-US" sz="1800" kern="0" dirty="0">
+                <a:ea typeface="Arial Unicode MS" pitchFamily="34" charset="-128"/>
+                <a:cs typeface="Arial Unicode MS" pitchFamily="34" charset="-128"/>
+              </a:rPr>
+              <a:t>Only includes what is really necessary for app to run</a:t>
+            </a:r>
+          </a:p>
+        </p:txBody>
+      </p:sp>
+    </p:spTree>
+    <p:extLst>
+      <p:ext uri="{BB962C8B-B14F-4D97-AF65-F5344CB8AC3E}">
+        <p14:creationId xmlns:p14="http://schemas.microsoft.com/office/powerpoint/2010/main" val="4101423017"/>
+      </p:ext>
+    </p:extLst>
+  </p:cSld>
+  <p:clrMapOvr>
+    <a:masterClrMapping/>
+  </p:clrMapOvr>
+  <p:timing>
+    <p:tnLst>
+      <p:par>
+        <p:cTn id="1" dur="indefinite" restart="never" nodeType="tmRoot">
+          <p:childTnLst>
+            <p:seq concurrent="1" nextAc="seek">
+              <p:cTn id="2" dur="indefinite" nodeType="mainSeq">
+                <p:childTnLst>
+                  <p:par>
+                    <p:cTn id="3" fill="hold">
+                      <p:stCondLst>
+                        <p:cond delay="indefinite"/>
+                      </p:stCondLst>
+                      <p:childTnLst>
+                        <p:par>
+                          <p:cTn id="4" fill="hold">
+                            <p:stCondLst>
+                              <p:cond delay="0"/>
+                            </p:stCondLst>
+                            <p:childTnLst>
+                              <p:par>
+                                <p:cTn id="5" presetID="1" presetClass="entr" presetSubtype="0" fill="hold" grpId="0" nodeType="clickEffect">
+                                  <p:stCondLst>
+                                    <p:cond delay="0"/>
+                                  </p:stCondLst>
+                                  <p:childTnLst>
+                                    <p:set>
+                                      <p:cBhvr>
+                                        <p:cTn id="6" dur="1" fill="hold">
+                                          <p:stCondLst>
+                                            <p:cond delay="0"/>
+                                          </p:stCondLst>
+                                        </p:cTn>
+                                        <p:tgtEl>
+                                          <p:spTgt spid="6"/>
+                                        </p:tgtEl>
+                                        <p:attrNameLst>
+                                          <p:attrName>style.visibility</p:attrName>
+                                        </p:attrNameLst>
+                                      </p:cBhvr>
+                                      <p:to>
+                                        <p:strVal val="visible"/>
+                                      </p:to>
+                                    </p:set>
+                                  </p:childTnLst>
+                                </p:cTn>
+                              </p:par>
+                              <p:par>
+                                <p:cTn id="7" presetID="1" presetClass="entr" presetSubtype="0" fill="hold" grpId="0" nodeType="withEffect">
+                                  <p:stCondLst>
+                                    <p:cond delay="0"/>
+                                  </p:stCondLst>
+                                  <p:childTnLst>
+                                    <p:set>
+                                      <p:cBhvr>
+                                        <p:cTn id="8" dur="1" fill="hold">
+                                          <p:stCondLst>
+                                            <p:cond delay="0"/>
+                                          </p:stCondLst>
+                                        </p:cTn>
+                                        <p:tgtEl>
+                                          <p:spTgt spid="10"/>
+                                        </p:tgtEl>
+                                        <p:attrNameLst>
+                                          <p:attrName>style.visibility</p:attrName>
+                                        </p:attrNameLst>
+                                      </p:cBhvr>
+                                      <p:to>
+                                        <p:strVal val="visible"/>
+                                      </p:to>
+                                    </p:set>
+                                  </p:childTnLst>
+                                </p:cTn>
+                              </p:par>
+                            </p:childTnLst>
+                          </p:cTn>
+                        </p:par>
+                      </p:childTnLst>
+                    </p:cTn>
+                  </p:par>
+                  <p:par>
+                    <p:cTn id="9" fill="hold">
+                      <p:stCondLst>
+                        <p:cond delay="indefinite"/>
+                      </p:stCondLst>
+                      <p:childTnLst>
+                        <p:par>
+                          <p:cTn id="10" fill="hold">
+                            <p:stCondLst>
+                              <p:cond delay="0"/>
+                            </p:stCondLst>
+                            <p:childTnLst>
+                              <p:par>
+                                <p:cTn id="11" presetID="1" presetClass="exit" presetSubtype="0" fill="hold" grpId="1" nodeType="clickEffect">
+                                  <p:stCondLst>
+                                    <p:cond delay="0"/>
+                                  </p:stCondLst>
+                                  <p:childTnLst>
+                                    <p:set>
+                                      <p:cBhvr>
+                                        <p:cTn id="12" dur="1" fill="hold">
+                                          <p:stCondLst>
+                                            <p:cond delay="0"/>
+                                          </p:stCondLst>
+                                        </p:cTn>
+                                        <p:tgtEl>
+                                          <p:spTgt spid="6"/>
+                                        </p:tgtEl>
+                                        <p:attrNameLst>
+                                          <p:attrName>style.visibility</p:attrName>
+                                        </p:attrNameLst>
+                                      </p:cBhvr>
+                                      <p:to>
+                                        <p:strVal val="hidden"/>
+                                      </p:to>
+                                    </p:set>
+                                  </p:childTnLst>
+                                </p:cTn>
+                              </p:par>
+                              <p:par>
+                                <p:cTn id="13" presetID="1" presetClass="exit" presetSubtype="0" fill="hold" grpId="1" nodeType="withEffect">
+                                  <p:stCondLst>
+                                    <p:cond delay="0"/>
+                                  </p:stCondLst>
+                                  <p:childTnLst>
+                                    <p:set>
+                                      <p:cBhvr>
+                                        <p:cTn id="14" dur="1" fill="hold">
+                                          <p:stCondLst>
+                                            <p:cond delay="0"/>
+                                          </p:stCondLst>
+                                        </p:cTn>
+                                        <p:tgtEl>
+                                          <p:spTgt spid="10"/>
+                                        </p:tgtEl>
+                                        <p:attrNameLst>
+                                          <p:attrName>style.visibility</p:attrName>
+                                        </p:attrNameLst>
+                                      </p:cBhvr>
+                                      <p:to>
+                                        <p:strVal val="hidden"/>
+                                      </p:to>
+                                    </p:set>
+                                  </p:childTnLst>
+                                </p:cTn>
+                              </p:par>
+                            </p:childTnLst>
+                          </p:cTn>
+                        </p:par>
+                        <p:par>
+                          <p:cTn id="15" fill="hold">
+                            <p:stCondLst>
+                              <p:cond delay="0"/>
+                            </p:stCondLst>
+                            <p:childTnLst>
+                              <p:par>
+                                <p:cTn id="16" presetID="1" presetClass="entr" presetSubtype="0" fill="hold" grpId="0" nodeType="afterEffect">
+                                  <p:stCondLst>
+                                    <p:cond delay="0"/>
+                                  </p:stCondLst>
+                                  <p:childTnLst>
+                                    <p:set>
+                                      <p:cBhvr>
+                                        <p:cTn id="17" dur="1" fill="hold">
+                                          <p:stCondLst>
+                                            <p:cond delay="0"/>
+                                          </p:stCondLst>
+                                        </p:cTn>
+                                        <p:tgtEl>
+                                          <p:spTgt spid="8"/>
+                                        </p:tgtEl>
+                                        <p:attrNameLst>
+                                          <p:attrName>style.visibility</p:attrName>
+                                        </p:attrNameLst>
+                                      </p:cBhvr>
+                                      <p:to>
+                                        <p:strVal val="visible"/>
+                                      </p:to>
+                                    </p:set>
+                                  </p:childTnLst>
+                                </p:cTn>
+                              </p:par>
+                            </p:childTnLst>
+                          </p:cTn>
+                        </p:par>
+                        <p:par>
+                          <p:cTn id="18" fill="hold">
+                            <p:stCondLst>
+                              <p:cond delay="0"/>
+                            </p:stCondLst>
+                            <p:childTnLst>
+                              <p:par>
+                                <p:cTn id="19" presetID="1" presetClass="entr" presetSubtype="0" fill="hold" grpId="0" nodeType="afterEffect">
+                                  <p:stCondLst>
+                                    <p:cond delay="0"/>
+                                  </p:stCondLst>
+                                  <p:childTnLst>
+                                    <p:set>
+                                      <p:cBhvr>
+                                        <p:cTn id="20" dur="1" fill="hold">
+                                          <p:stCondLst>
+                                            <p:cond delay="0"/>
+                                          </p:stCondLst>
+                                        </p:cTn>
+                                        <p:tgtEl>
+                                          <p:spTgt spid="11"/>
+                                        </p:tgtEl>
+                                        <p:attrNameLst>
+                                          <p:attrName>style.visibility</p:attrName>
+                                        </p:attrNameLst>
+                                      </p:cBhvr>
+                                      <p:to>
+                                        <p:strVal val="visible"/>
+                                      </p:to>
+                                    </p:set>
+                                  </p:childTnLst>
+                                </p:cTn>
+                              </p:par>
+                            </p:childTnLst>
+                          </p:cTn>
+                        </p:par>
+                      </p:childTnLst>
+                    </p:cTn>
+                  </p:par>
+                  <p:par>
+                    <p:cTn id="21" fill="hold">
+                      <p:stCondLst>
+                        <p:cond delay="indefinite"/>
+                      </p:stCondLst>
+                      <p:childTnLst>
+                        <p:par>
+                          <p:cTn id="22" fill="hold">
+                            <p:stCondLst>
+                              <p:cond delay="0"/>
+                            </p:stCondLst>
+                            <p:childTnLst>
+                              <p:par>
+                                <p:cTn id="23" presetID="1" presetClass="exit" presetSubtype="0" fill="hold" grpId="1" nodeType="clickEffect">
+                                  <p:stCondLst>
+                                    <p:cond delay="0"/>
+                                  </p:stCondLst>
+                                  <p:childTnLst>
+                                    <p:set>
+                                      <p:cBhvr>
+                                        <p:cTn id="24" dur="1" fill="hold">
+                                          <p:stCondLst>
+                                            <p:cond delay="0"/>
+                                          </p:stCondLst>
+                                        </p:cTn>
+                                        <p:tgtEl>
+                                          <p:spTgt spid="8"/>
+                                        </p:tgtEl>
+                                        <p:attrNameLst>
+                                          <p:attrName>style.visibility</p:attrName>
+                                        </p:attrNameLst>
+                                      </p:cBhvr>
+                                      <p:to>
+                                        <p:strVal val="hidden"/>
+                                      </p:to>
+                                    </p:set>
+                                  </p:childTnLst>
+                                </p:cTn>
+                              </p:par>
+                              <p:par>
+                                <p:cTn id="25" presetID="1" presetClass="exit" presetSubtype="0" fill="hold" grpId="1" nodeType="withEffect">
+                                  <p:stCondLst>
+                                    <p:cond delay="0"/>
+                                  </p:stCondLst>
+                                  <p:childTnLst>
+                                    <p:set>
+                                      <p:cBhvr>
+                                        <p:cTn id="26" dur="1" fill="hold">
+                                          <p:stCondLst>
+                                            <p:cond delay="0"/>
+                                          </p:stCondLst>
+                                        </p:cTn>
+                                        <p:tgtEl>
+                                          <p:spTgt spid="11"/>
+                                        </p:tgtEl>
+                                        <p:attrNameLst>
+                                          <p:attrName>style.visibility</p:attrName>
+                                        </p:attrNameLst>
+                                      </p:cBhvr>
+                                      <p:to>
+                                        <p:strVal val="hidden"/>
+                                      </p:to>
+                                    </p:set>
+                                  </p:childTnLst>
+                                </p:cTn>
+                              </p:par>
+                            </p:childTnLst>
+                          </p:cTn>
+                        </p:par>
+                        <p:par>
+                          <p:cTn id="27" fill="hold">
+                            <p:stCondLst>
+                              <p:cond delay="0"/>
+                            </p:stCondLst>
+                            <p:childTnLst>
+                              <p:par>
+                                <p:cTn id="28" presetID="1" presetClass="entr" presetSubtype="0" fill="hold" grpId="0" nodeType="afterEffect">
+                                  <p:stCondLst>
+                                    <p:cond delay="0"/>
+                                  </p:stCondLst>
+                                  <p:childTnLst>
+                                    <p:set>
+                                      <p:cBhvr>
+                                        <p:cTn id="29" dur="1" fill="hold">
+                                          <p:stCondLst>
+                                            <p:cond delay="0"/>
+                                          </p:stCondLst>
+                                        </p:cTn>
+                                        <p:tgtEl>
+                                          <p:spTgt spid="7"/>
+                                        </p:tgtEl>
+                                        <p:attrNameLst>
+                                          <p:attrName>style.visibility</p:attrName>
+                                        </p:attrNameLst>
+                                      </p:cBhvr>
+                                      <p:to>
+                                        <p:strVal val="visible"/>
+                                      </p:to>
+                                    </p:set>
+                                  </p:childTnLst>
+                                </p:cTn>
+                              </p:par>
+                            </p:childTnLst>
+                          </p:cTn>
+                        </p:par>
+                        <p:par>
+                          <p:cTn id="30" fill="hold">
+                            <p:stCondLst>
+                              <p:cond delay="0"/>
+                            </p:stCondLst>
+                            <p:childTnLst>
+                              <p:par>
+                                <p:cTn id="31" presetID="1" presetClass="entr" presetSubtype="0" fill="hold" grpId="0" nodeType="afterEffect">
+                                  <p:stCondLst>
+                                    <p:cond delay="0"/>
+                                  </p:stCondLst>
+                                  <p:childTnLst>
+                                    <p:set>
+                                      <p:cBhvr>
+                                        <p:cTn id="32" dur="1" fill="hold">
+                                          <p:stCondLst>
+                                            <p:cond delay="0"/>
+                                          </p:stCondLst>
+                                        </p:cTn>
+                                        <p:tgtEl>
+                                          <p:spTgt spid="12"/>
+                                        </p:tgtEl>
+                                        <p:attrNameLst>
+                                          <p:attrName>style.visibility</p:attrName>
+                                        </p:attrNameLst>
+                                      </p:cBhvr>
+                                      <p:to>
+                                        <p:strVal val="visible"/>
+                                      </p:to>
+                                    </p:set>
+                                  </p:childTnLst>
+                                </p:cTn>
+                              </p:par>
+                            </p:childTnLst>
+                          </p:cTn>
+                        </p:par>
+                      </p:childTnLst>
+                    </p:cTn>
+                  </p:par>
+                  <p:par>
+                    <p:cTn id="33" fill="hold">
+                      <p:stCondLst>
+                        <p:cond delay="indefinite"/>
+                      </p:stCondLst>
+                      <p:childTnLst>
+                        <p:par>
+                          <p:cTn id="34" fill="hold">
+                            <p:stCondLst>
+                              <p:cond delay="0"/>
+                            </p:stCondLst>
+                            <p:childTnLst>
+                              <p:par>
+                                <p:cTn id="35" presetID="1" presetClass="exit" presetSubtype="0" fill="hold" grpId="1" nodeType="clickEffect">
+                                  <p:stCondLst>
+                                    <p:cond delay="0"/>
+                                  </p:stCondLst>
+                                  <p:childTnLst>
+                                    <p:set>
+                                      <p:cBhvr>
+                                        <p:cTn id="36" dur="1" fill="hold">
+                                          <p:stCondLst>
+                                            <p:cond delay="0"/>
+                                          </p:stCondLst>
+                                        </p:cTn>
+                                        <p:tgtEl>
+                                          <p:spTgt spid="7"/>
+                                        </p:tgtEl>
+                                        <p:attrNameLst>
+                                          <p:attrName>style.visibility</p:attrName>
+                                        </p:attrNameLst>
+                                      </p:cBhvr>
+                                      <p:to>
+                                        <p:strVal val="hidden"/>
+                                      </p:to>
+                                    </p:set>
+                                  </p:childTnLst>
+                                </p:cTn>
+                              </p:par>
+                              <p:par>
+                                <p:cTn id="37" presetID="1" presetClass="exit" presetSubtype="0" fill="hold" grpId="1" nodeType="withEffect">
+                                  <p:stCondLst>
+                                    <p:cond delay="0"/>
+                                  </p:stCondLst>
+                                  <p:childTnLst>
+                                    <p:set>
+                                      <p:cBhvr>
+                                        <p:cTn id="38" dur="1" fill="hold">
+                                          <p:stCondLst>
+                                            <p:cond delay="0"/>
+                                          </p:stCondLst>
+                                        </p:cTn>
+                                        <p:tgtEl>
+                                          <p:spTgt spid="12"/>
+                                        </p:tgtEl>
+                                        <p:attrNameLst>
+                                          <p:attrName>style.visibility</p:attrName>
+                                        </p:attrNameLst>
+                                      </p:cBhvr>
+                                      <p:to>
+                                        <p:strVal val="hidden"/>
+                                      </p:to>
+                                    </p:set>
+                                  </p:childTnLst>
+                                </p:cTn>
+                              </p:par>
+                            </p:childTnLst>
+                          </p:cTn>
+                        </p:par>
+                        <p:par>
+                          <p:cTn id="39" fill="hold">
+                            <p:stCondLst>
+                              <p:cond delay="0"/>
+                            </p:stCondLst>
+                            <p:childTnLst>
+                              <p:par>
+                                <p:cTn id="40" presetID="1" presetClass="entr" presetSubtype="0" fill="hold" grpId="0" nodeType="afterEffect">
+                                  <p:stCondLst>
+                                    <p:cond delay="0"/>
+                                  </p:stCondLst>
+                                  <p:childTnLst>
+                                    <p:set>
+                                      <p:cBhvr>
+                                        <p:cTn id="41" dur="1" fill="hold">
+                                          <p:stCondLst>
+                                            <p:cond delay="0"/>
+                                          </p:stCondLst>
+                                        </p:cTn>
+                                        <p:tgtEl>
+                                          <p:spTgt spid="9"/>
+                                        </p:tgtEl>
+                                        <p:attrNameLst>
+                                          <p:attrName>style.visibility</p:attrName>
+                                        </p:attrNameLst>
+                                      </p:cBhvr>
+                                      <p:to>
+                                        <p:strVal val="visible"/>
+                                      </p:to>
+                                    </p:set>
+                                  </p:childTnLst>
+                                </p:cTn>
+                              </p:par>
+                            </p:childTnLst>
+                          </p:cTn>
+                        </p:par>
+                        <p:par>
+                          <p:cTn id="42" fill="hold">
+                            <p:stCondLst>
+                              <p:cond delay="0"/>
+                            </p:stCondLst>
+                            <p:childTnLst>
+                              <p:par>
+                                <p:cTn id="43" presetID="1" presetClass="entr" presetSubtype="0" fill="hold" grpId="0" nodeType="afterEffect">
+                                  <p:stCondLst>
+                                    <p:cond delay="0"/>
+                                  </p:stCondLst>
+                                  <p:childTnLst>
+                                    <p:set>
+                                      <p:cBhvr>
+                                        <p:cTn id="44" dur="1" fill="hold">
+                                          <p:stCondLst>
+                                            <p:cond delay="0"/>
+                                          </p:stCondLst>
+                                        </p:cTn>
+                                        <p:tgtEl>
+                                          <p:spTgt spid="13"/>
+                                        </p:tgtEl>
+                                        <p:attrNameLst>
+                                          <p:attrName>style.visibility</p:attrName>
+                                        </p:attrNameLst>
+                                      </p:cBhvr>
+                                      <p:to>
+                                        <p:strVal val="visible"/>
+                                      </p:to>
+                                    </p:set>
+                                  </p:childTnLst>
+                                </p:cTn>
+                              </p:par>
+                            </p:childTnLst>
+                          </p:cTn>
+                        </p:par>
+                      </p:childTnLst>
+                    </p:cTn>
+                  </p:par>
+                  <p:par>
+                    <p:cTn id="45" fill="hold">
+                      <p:stCondLst>
+                        <p:cond delay="indefinite"/>
+                      </p:stCondLst>
+                      <p:childTnLst>
+                        <p:par>
+                          <p:cTn id="46" fill="hold">
+                            <p:stCondLst>
+                              <p:cond delay="0"/>
+                            </p:stCondLst>
+                            <p:childTnLst>
+                              <p:par>
+                                <p:cTn id="47" presetID="1" presetClass="exit" presetSubtype="0" fill="hold" grpId="1" nodeType="clickEffect">
+                                  <p:stCondLst>
+                                    <p:cond delay="0"/>
+                                  </p:stCondLst>
+                                  <p:childTnLst>
+                                    <p:set>
+                                      <p:cBhvr>
+                                        <p:cTn id="48" dur="1" fill="hold">
+                                          <p:stCondLst>
+                                            <p:cond delay="0"/>
+                                          </p:stCondLst>
+                                        </p:cTn>
+                                        <p:tgtEl>
+                                          <p:spTgt spid="9"/>
+                                        </p:tgtEl>
+                                        <p:attrNameLst>
+                                          <p:attrName>style.visibility</p:attrName>
+                                        </p:attrNameLst>
+                                      </p:cBhvr>
+                                      <p:to>
+                                        <p:strVal val="hidden"/>
+                                      </p:to>
+                                    </p:set>
+                                  </p:childTnLst>
+                                </p:cTn>
+                              </p:par>
+                              <p:par>
+                                <p:cTn id="49" presetID="1" presetClass="exit" presetSubtype="0" fill="hold" grpId="1" nodeType="withEffect">
+                                  <p:stCondLst>
+                                    <p:cond delay="0"/>
+                                  </p:stCondLst>
+                                  <p:childTnLst>
+                                    <p:set>
+                                      <p:cBhvr>
+                                        <p:cTn id="50" dur="1" fill="hold">
+                                          <p:stCondLst>
+                                            <p:cond delay="0"/>
+                                          </p:stCondLst>
+                                        </p:cTn>
+                                        <p:tgtEl>
+                                          <p:spTgt spid="13"/>
+                                        </p:tgtEl>
+                                        <p:attrNameLst>
+                                          <p:attrName>style.visibility</p:attrName>
+                                        </p:attrNameLst>
+                                      </p:cBhvr>
+                                      <p:to>
+                                        <p:strVal val="hidden"/>
+                                      </p:to>
+                                    </p:set>
+                                  </p:childTnLst>
+                                </p:cTn>
+                              </p:par>
+                            </p:childTnLst>
+                          </p:cTn>
+                        </p:par>
+                      </p:childTnLst>
+                    </p:cTn>
+                  </p:par>
+                </p:childTnLst>
+              </p:cTn>
+              <p:prevCondLst>
+                <p:cond evt="onPrev" delay="0">
+                  <p:tgtEl>
+                    <p:sldTgt/>
+                  </p:tgtEl>
+                </p:cond>
+              </p:prevCondLst>
+              <p:nextCondLst>
+                <p:cond evt="onNext" delay="0">
+                  <p:tgtEl>
+                    <p:sldTgt/>
+                  </p:tgtEl>
+                </p:cond>
+              </p:nextCondLst>
+            </p:seq>
+          </p:childTnLst>
+        </p:cTn>
+      </p:par>
+    </p:tnLst>
+    <p:bldLst>
+      <p:bldP spid="6" grpId="0" animBg="1"/>
+      <p:bldP spid="6" grpId="1" animBg="1"/>
+      <p:bldP spid="7" grpId="0" animBg="1"/>
+      <p:bldP spid="7" grpId="1" animBg="1"/>
+      <p:bldP spid="8" grpId="0" animBg="1"/>
+      <p:bldP spid="8" grpId="1" animBg="1"/>
+      <p:bldP spid="9" grpId="0" animBg="1"/>
+      <p:bldP spid="9" grpId="1" animBg="1"/>
+      <p:bldP spid="10" grpId="0" animBg="1"/>
+      <p:bldP spid="10" grpId="1" animBg="1"/>
+      <p:bldP spid="11" grpId="0" animBg="1"/>
+      <p:bldP spid="11" grpId="1" animBg="1"/>
+      <p:bldP spid="12" grpId="0" animBg="1"/>
+      <p:bldP spid="12" grpId="1" animBg="1"/>
+      <p:bldP spid="13" grpId="0" animBg="1"/>
+      <p:bldP spid="13" grpId="1" animBg="1"/>
+    </p:bldLst>
+  </p:timing>
 </p:sld>
 </file>
 

</xml_diff>